<commit_message>
Final tweaks for the conference.
</commit_message>
<xml_diff>
--- a/BetterRubyThroughDesignPatterns.pptx
+++ b/BetterRubyThroughDesignPatterns.pptx
@@ -5,7 +5,7 @@
     <p:sldMasterId id="2147483696" r:id="rId1"/>
   </p:sldMasterIdLst>
   <p:notesMasterIdLst>
-    <p:notesMasterId r:id="rId31"/>
+    <p:notesMasterId r:id="rId39"/>
   </p:notesMasterIdLst>
   <p:sldIdLst>
     <p:sldId id="256" r:id="rId2"/>
@@ -24,19 +24,27 @@
     <p:sldId id="273" r:id="rId15"/>
     <p:sldId id="274" r:id="rId16"/>
     <p:sldId id="278" r:id="rId17"/>
-    <p:sldId id="276" r:id="rId18"/>
-    <p:sldId id="279" r:id="rId19"/>
-    <p:sldId id="277" r:id="rId20"/>
-    <p:sldId id="280" r:id="rId21"/>
-    <p:sldId id="271" r:id="rId22"/>
-    <p:sldId id="282" r:id="rId23"/>
-    <p:sldId id="285" r:id="rId24"/>
-    <p:sldId id="286" r:id="rId25"/>
-    <p:sldId id="287" r:id="rId26"/>
-    <p:sldId id="288" r:id="rId27"/>
-    <p:sldId id="289" r:id="rId28"/>
-    <p:sldId id="290" r:id="rId29"/>
-    <p:sldId id="266" r:id="rId30"/>
+    <p:sldId id="291" r:id="rId18"/>
+    <p:sldId id="292" r:id="rId19"/>
+    <p:sldId id="293" r:id="rId20"/>
+    <p:sldId id="276" r:id="rId21"/>
+    <p:sldId id="279" r:id="rId22"/>
+    <p:sldId id="294" r:id="rId23"/>
+    <p:sldId id="295" r:id="rId24"/>
+    <p:sldId id="296" r:id="rId25"/>
+    <p:sldId id="297" r:id="rId26"/>
+    <p:sldId id="298" r:id="rId27"/>
+    <p:sldId id="277" r:id="rId28"/>
+    <p:sldId id="280" r:id="rId29"/>
+    <p:sldId id="271" r:id="rId30"/>
+    <p:sldId id="282" r:id="rId31"/>
+    <p:sldId id="285" r:id="rId32"/>
+    <p:sldId id="286" r:id="rId33"/>
+    <p:sldId id="287" r:id="rId34"/>
+    <p:sldId id="288" r:id="rId35"/>
+    <p:sldId id="289" r:id="rId36"/>
+    <p:sldId id="290" r:id="rId37"/>
+    <p:sldId id="266" r:id="rId38"/>
   </p:sldIdLst>
   <p:sldSz cx="9144000" cy="6858000" type="screen4x3"/>
   <p:notesSz cx="6858000" cy="9144000"/>
@@ -156,8 +164,16 @@
             <p14:sldId id="273"/>
             <p14:sldId id="274"/>
             <p14:sldId id="278"/>
+            <p14:sldId id="291"/>
+            <p14:sldId id="292"/>
+            <p14:sldId id="293"/>
             <p14:sldId id="276"/>
             <p14:sldId id="279"/>
+            <p14:sldId id="294"/>
+            <p14:sldId id="295"/>
+            <p14:sldId id="296"/>
+            <p14:sldId id="297"/>
+            <p14:sldId id="298"/>
             <p14:sldId id="277"/>
             <p14:sldId id="280"/>
             <p14:sldId id="271"/>
@@ -259,7 +275,7 @@
           <a:p>
             <a:fld id="{5A1F8130-46FA-7040-B513-FDA7EF4EBAF4}" type="datetimeFigureOut">
               <a:rPr lang="en-US" smtClean="0"/>
-              <a:t>3/12/12</a:t>
+              <a:t>3/13/12</a:t>
             </a:fld>
             <a:endParaRPr lang="en-US"/>
           </a:p>
@@ -894,6 +910,475 @@
 </p:notes>
 </file>
 
+<file path=ppt/notesSlides/notesSlide5.xml><?xml version="1.0" encoding="utf-8"?>
+<p:notes xmlns:a="http://schemas.openxmlformats.org/drawingml/2006/main" xmlns:r="http://schemas.openxmlformats.org/officeDocument/2006/relationships" xmlns:p="http://schemas.openxmlformats.org/presentationml/2006/main">
+  <p:cSld>
+    <p:spTree>
+      <p:nvGrpSpPr>
+        <p:cNvPr id="1" name=""/>
+        <p:cNvGrpSpPr/>
+        <p:nvPr/>
+      </p:nvGrpSpPr>
+      <p:grpSpPr>
+        <a:xfrm>
+          <a:off x="0" y="0"/>
+          <a:ext cx="0" cy="0"/>
+          <a:chOff x="0" y="0"/>
+          <a:chExt cx="0" cy="0"/>
+        </a:xfrm>
+      </p:grpSpPr>
+      <p:sp>
+        <p:nvSpPr>
+          <p:cNvPr id="2" name="Slide Image Placeholder 1"/>
+          <p:cNvSpPr>
+            <a:spLocks noGrp="1" noRot="1" noChangeAspect="1"/>
+          </p:cNvSpPr>
+          <p:nvPr>
+            <p:ph type="sldImg"/>
+          </p:nvPr>
+        </p:nvSpPr>
+        <p:spPr/>
+      </p:sp>
+      <p:sp>
+        <p:nvSpPr>
+          <p:cNvPr id="3" name="Notes Placeholder 2"/>
+          <p:cNvSpPr>
+            <a:spLocks noGrp="1"/>
+          </p:cNvSpPr>
+          <p:nvPr>
+            <p:ph type="body" idx="1"/>
+          </p:nvPr>
+        </p:nvSpPr>
+        <p:spPr/>
+        <p:txBody>
+          <a:bodyPr/>
+          <a:lstStyle/>
+          <a:p>
+            <a:endParaRPr lang="en-US" dirty="0"/>
+          </a:p>
+        </p:txBody>
+      </p:sp>
+      <p:sp>
+        <p:nvSpPr>
+          <p:cNvPr id="4" name="Slide Number Placeholder 3"/>
+          <p:cNvSpPr>
+            <a:spLocks noGrp="1"/>
+          </p:cNvSpPr>
+          <p:nvPr>
+            <p:ph type="sldNum" sz="quarter" idx="10"/>
+          </p:nvPr>
+        </p:nvSpPr>
+        <p:spPr/>
+        <p:txBody>
+          <a:bodyPr/>
+          <a:lstStyle/>
+          <a:p>
+            <a:fld id="{5B0F0E0A-5925-EE41-9E85-45EE46DBCCF5}" type="slidenum">
+              <a:rPr lang="en-US" smtClean="0"/>
+              <a:t>17</a:t>
+            </a:fld>
+            <a:endParaRPr lang="en-US"/>
+          </a:p>
+        </p:txBody>
+      </p:sp>
+    </p:spTree>
+    <p:extLst>
+      <p:ext uri="{BB962C8B-B14F-4D97-AF65-F5344CB8AC3E}">
+        <p14:creationId xmlns:p14="http://schemas.microsoft.com/office/powerpoint/2010/main" val="2402981392"/>
+      </p:ext>
+    </p:extLst>
+  </p:cSld>
+  <p:clrMapOvr>
+    <a:masterClrMapping/>
+  </p:clrMapOvr>
+</p:notes>
+</file>
+
+<file path=ppt/notesSlides/notesSlide6.xml><?xml version="1.0" encoding="utf-8"?>
+<p:notes xmlns:a="http://schemas.openxmlformats.org/drawingml/2006/main" xmlns:r="http://schemas.openxmlformats.org/officeDocument/2006/relationships" xmlns:p="http://schemas.openxmlformats.org/presentationml/2006/main">
+  <p:cSld>
+    <p:spTree>
+      <p:nvGrpSpPr>
+        <p:cNvPr id="1" name=""/>
+        <p:cNvGrpSpPr/>
+        <p:nvPr/>
+      </p:nvGrpSpPr>
+      <p:grpSpPr>
+        <a:xfrm>
+          <a:off x="0" y="0"/>
+          <a:ext cx="0" cy="0"/>
+          <a:chOff x="0" y="0"/>
+          <a:chExt cx="0" cy="0"/>
+        </a:xfrm>
+      </p:grpSpPr>
+      <p:sp>
+        <p:nvSpPr>
+          <p:cNvPr id="2" name="Slide Image Placeholder 1"/>
+          <p:cNvSpPr>
+            <a:spLocks noGrp="1" noRot="1" noChangeAspect="1"/>
+          </p:cNvSpPr>
+          <p:nvPr>
+            <p:ph type="sldImg"/>
+          </p:nvPr>
+        </p:nvSpPr>
+        <p:spPr/>
+      </p:sp>
+      <p:sp>
+        <p:nvSpPr>
+          <p:cNvPr id="3" name="Notes Placeholder 2"/>
+          <p:cNvSpPr>
+            <a:spLocks noGrp="1"/>
+          </p:cNvSpPr>
+          <p:nvPr>
+            <p:ph type="body" idx="1"/>
+          </p:nvPr>
+        </p:nvSpPr>
+        <p:spPr/>
+        <p:txBody>
+          <a:bodyPr/>
+          <a:lstStyle/>
+          <a:p>
+            <a:endParaRPr lang="en-US" dirty="0"/>
+          </a:p>
+        </p:txBody>
+      </p:sp>
+      <p:sp>
+        <p:nvSpPr>
+          <p:cNvPr id="4" name="Slide Number Placeholder 3"/>
+          <p:cNvSpPr>
+            <a:spLocks noGrp="1"/>
+          </p:cNvSpPr>
+          <p:nvPr>
+            <p:ph type="sldNum" sz="quarter" idx="10"/>
+          </p:nvPr>
+        </p:nvSpPr>
+        <p:spPr/>
+        <p:txBody>
+          <a:bodyPr/>
+          <a:lstStyle/>
+          <a:p>
+            <a:fld id="{5B0F0E0A-5925-EE41-9E85-45EE46DBCCF5}" type="slidenum">
+              <a:rPr lang="en-US" smtClean="0"/>
+              <a:t>18</a:t>
+            </a:fld>
+            <a:endParaRPr lang="en-US"/>
+          </a:p>
+        </p:txBody>
+      </p:sp>
+    </p:spTree>
+    <p:extLst>
+      <p:ext uri="{BB962C8B-B14F-4D97-AF65-F5344CB8AC3E}">
+        <p14:creationId xmlns:p14="http://schemas.microsoft.com/office/powerpoint/2010/main" val="2402981392"/>
+      </p:ext>
+    </p:extLst>
+  </p:cSld>
+  <p:clrMapOvr>
+    <a:masterClrMapping/>
+  </p:clrMapOvr>
+</p:notes>
+</file>
+
+<file path=ppt/notesSlides/notesSlide7.xml><?xml version="1.0" encoding="utf-8"?>
+<p:notes xmlns:a="http://schemas.openxmlformats.org/drawingml/2006/main" xmlns:r="http://schemas.openxmlformats.org/officeDocument/2006/relationships" xmlns:p="http://schemas.openxmlformats.org/presentationml/2006/main">
+  <p:cSld>
+    <p:spTree>
+      <p:nvGrpSpPr>
+        <p:cNvPr id="1" name=""/>
+        <p:cNvGrpSpPr/>
+        <p:nvPr/>
+      </p:nvGrpSpPr>
+      <p:grpSpPr>
+        <a:xfrm>
+          <a:off x="0" y="0"/>
+          <a:ext cx="0" cy="0"/>
+          <a:chOff x="0" y="0"/>
+          <a:chExt cx="0" cy="0"/>
+        </a:xfrm>
+      </p:grpSpPr>
+      <p:sp>
+        <p:nvSpPr>
+          <p:cNvPr id="2" name="Slide Image Placeholder 1"/>
+          <p:cNvSpPr>
+            <a:spLocks noGrp="1" noRot="1" noChangeAspect="1"/>
+          </p:cNvSpPr>
+          <p:nvPr>
+            <p:ph type="sldImg"/>
+          </p:nvPr>
+        </p:nvSpPr>
+        <p:spPr/>
+      </p:sp>
+      <p:sp>
+        <p:nvSpPr>
+          <p:cNvPr id="3" name="Notes Placeholder 2"/>
+          <p:cNvSpPr>
+            <a:spLocks noGrp="1"/>
+          </p:cNvSpPr>
+          <p:nvPr>
+            <p:ph type="body" idx="1"/>
+          </p:nvPr>
+        </p:nvSpPr>
+        <p:spPr/>
+        <p:txBody>
+          <a:bodyPr/>
+          <a:lstStyle/>
+          <a:p>
+            <a:endParaRPr lang="en-US" dirty="0"/>
+          </a:p>
+        </p:txBody>
+      </p:sp>
+      <p:sp>
+        <p:nvSpPr>
+          <p:cNvPr id="4" name="Slide Number Placeholder 3"/>
+          <p:cNvSpPr>
+            <a:spLocks noGrp="1"/>
+          </p:cNvSpPr>
+          <p:nvPr>
+            <p:ph type="sldNum" sz="quarter" idx="10"/>
+          </p:nvPr>
+        </p:nvSpPr>
+        <p:spPr/>
+        <p:txBody>
+          <a:bodyPr/>
+          <a:lstStyle/>
+          <a:p>
+            <a:fld id="{5B0F0E0A-5925-EE41-9E85-45EE46DBCCF5}" type="slidenum">
+              <a:rPr lang="en-US" smtClean="0"/>
+              <a:t>19</a:t>
+            </a:fld>
+            <a:endParaRPr lang="en-US"/>
+          </a:p>
+        </p:txBody>
+      </p:sp>
+    </p:spTree>
+    <p:extLst>
+      <p:ext uri="{BB962C8B-B14F-4D97-AF65-F5344CB8AC3E}">
+        <p14:creationId xmlns:p14="http://schemas.microsoft.com/office/powerpoint/2010/main" val="2402981392"/>
+      </p:ext>
+    </p:extLst>
+  </p:cSld>
+  <p:clrMapOvr>
+    <a:masterClrMapping/>
+  </p:clrMapOvr>
+</p:notes>
+</file>
+
+<file path=ppt/notesSlides/notesSlide8.xml><?xml version="1.0" encoding="utf-8"?>
+<p:notes xmlns:a="http://schemas.openxmlformats.org/drawingml/2006/main" xmlns:r="http://schemas.openxmlformats.org/officeDocument/2006/relationships" xmlns:p="http://schemas.openxmlformats.org/presentationml/2006/main">
+  <p:cSld>
+    <p:spTree>
+      <p:nvGrpSpPr>
+        <p:cNvPr id="1" name=""/>
+        <p:cNvGrpSpPr/>
+        <p:nvPr/>
+      </p:nvGrpSpPr>
+      <p:grpSpPr>
+        <a:xfrm>
+          <a:off x="0" y="0"/>
+          <a:ext cx="0" cy="0"/>
+          <a:chOff x="0" y="0"/>
+          <a:chExt cx="0" cy="0"/>
+        </a:xfrm>
+      </p:grpSpPr>
+      <p:sp>
+        <p:nvSpPr>
+          <p:cNvPr id="2" name="Slide Image Placeholder 1"/>
+          <p:cNvSpPr>
+            <a:spLocks noGrp="1" noRot="1" noChangeAspect="1"/>
+          </p:cNvSpPr>
+          <p:nvPr>
+            <p:ph type="sldImg"/>
+          </p:nvPr>
+        </p:nvSpPr>
+        <p:spPr/>
+      </p:sp>
+      <p:sp>
+        <p:nvSpPr>
+          <p:cNvPr id="3" name="Notes Placeholder 2"/>
+          <p:cNvSpPr>
+            <a:spLocks noGrp="1"/>
+          </p:cNvSpPr>
+          <p:nvPr>
+            <p:ph type="body" idx="1"/>
+          </p:nvPr>
+        </p:nvSpPr>
+        <p:spPr/>
+        <p:txBody>
+          <a:bodyPr/>
+          <a:lstStyle/>
+          <a:p>
+            <a:r>
+              <a:rPr lang="en-US" dirty="0" smtClean="0"/>
+              <a:t>These</a:t>
+            </a:r>
+            <a:r>
+              <a:rPr lang="en-US" baseline="0" dirty="0" smtClean="0"/>
+              <a:t> are principles, not hard and fast rules.</a:t>
+            </a:r>
+          </a:p>
+          <a:p>
+            <a:r>
+              <a:rPr lang="en-US" baseline="0" dirty="0" smtClean="0"/>
+              <a:t>Sometimes they conflict with other principles or just don’t make sense.</a:t>
+            </a:r>
+            <a:endParaRPr lang="en-US" dirty="0"/>
+          </a:p>
+        </p:txBody>
+      </p:sp>
+      <p:sp>
+        <p:nvSpPr>
+          <p:cNvPr id="4" name="Slide Number Placeholder 3"/>
+          <p:cNvSpPr>
+            <a:spLocks noGrp="1"/>
+          </p:cNvSpPr>
+          <p:nvPr>
+            <p:ph type="sldNum" sz="quarter" idx="10"/>
+          </p:nvPr>
+        </p:nvSpPr>
+        <p:spPr/>
+        <p:txBody>
+          <a:bodyPr/>
+          <a:lstStyle/>
+          <a:p>
+            <a:fld id="{5B0F0E0A-5925-EE41-9E85-45EE46DBCCF5}" type="slidenum">
+              <a:rPr lang="en-US" smtClean="0"/>
+              <a:t>35</a:t>
+            </a:fld>
+            <a:endParaRPr lang="en-US"/>
+          </a:p>
+        </p:txBody>
+      </p:sp>
+    </p:spTree>
+    <p:extLst>
+      <p:ext uri="{BB962C8B-B14F-4D97-AF65-F5344CB8AC3E}">
+        <p14:creationId xmlns:p14="http://schemas.microsoft.com/office/powerpoint/2010/main" val="1172683172"/>
+      </p:ext>
+    </p:extLst>
+  </p:cSld>
+  <p:clrMapOvr>
+    <a:masterClrMapping/>
+  </p:clrMapOvr>
+</p:notes>
+</file>
+
+<file path=ppt/notesSlides/notesSlide9.xml><?xml version="1.0" encoding="utf-8"?>
+<p:notes xmlns:a="http://schemas.openxmlformats.org/drawingml/2006/main" xmlns:r="http://schemas.openxmlformats.org/officeDocument/2006/relationships" xmlns:p="http://schemas.openxmlformats.org/presentationml/2006/main">
+  <p:cSld>
+    <p:spTree>
+      <p:nvGrpSpPr>
+        <p:cNvPr id="1" name=""/>
+        <p:cNvGrpSpPr/>
+        <p:nvPr/>
+      </p:nvGrpSpPr>
+      <p:grpSpPr>
+        <a:xfrm>
+          <a:off x="0" y="0"/>
+          <a:ext cx="0" cy="0"/>
+          <a:chOff x="0" y="0"/>
+          <a:chExt cx="0" cy="0"/>
+        </a:xfrm>
+      </p:grpSpPr>
+      <p:sp>
+        <p:nvSpPr>
+          <p:cNvPr id="2" name="Slide Image Placeholder 1"/>
+          <p:cNvSpPr>
+            <a:spLocks noGrp="1" noRot="1" noChangeAspect="1"/>
+          </p:cNvSpPr>
+          <p:nvPr>
+            <p:ph type="sldImg"/>
+          </p:nvPr>
+        </p:nvSpPr>
+        <p:spPr/>
+      </p:sp>
+      <p:sp>
+        <p:nvSpPr>
+          <p:cNvPr id="3" name="Notes Placeholder 2"/>
+          <p:cNvSpPr>
+            <a:spLocks noGrp="1"/>
+          </p:cNvSpPr>
+          <p:nvPr>
+            <p:ph type="body" idx="1"/>
+          </p:nvPr>
+        </p:nvSpPr>
+        <p:spPr/>
+        <p:txBody>
+          <a:bodyPr/>
+          <a:lstStyle/>
+          <a:p>
+            <a:r>
+              <a:rPr lang="en-US" dirty="0" smtClean="0"/>
+              <a:t>Thanks to the conference</a:t>
+            </a:r>
+            <a:r>
+              <a:rPr lang="en-US" baseline="0" dirty="0" smtClean="0"/>
+              <a:t> organizers.</a:t>
+            </a:r>
+            <a:endParaRPr lang="en-US" dirty="0" smtClean="0"/>
+          </a:p>
+          <a:p>
+            <a:r>
+              <a:rPr lang="en-US" dirty="0" smtClean="0"/>
+              <a:t>Thanks to</a:t>
+            </a:r>
+            <a:r>
+              <a:rPr lang="en-US" baseline="0" dirty="0" smtClean="0"/>
+              <a:t> you all for listening.</a:t>
+            </a:r>
+          </a:p>
+          <a:p>
+            <a:r>
+              <a:rPr lang="en-US" baseline="0" dirty="0" smtClean="0"/>
+              <a:t>Thanks to the Boulder Ruby Group, especially David </a:t>
+            </a:r>
+            <a:r>
+              <a:rPr lang="en-US" baseline="0" dirty="0" err="1" smtClean="0"/>
+              <a:t>Hassler</a:t>
+            </a:r>
+            <a:r>
+              <a:rPr lang="en-US" baseline="0" dirty="0" smtClean="0"/>
+              <a:t>, for improving this talk via feedback.</a:t>
+            </a:r>
+          </a:p>
+          <a:p>
+            <a:endParaRPr lang="en-US" dirty="0"/>
+          </a:p>
+        </p:txBody>
+      </p:sp>
+      <p:sp>
+        <p:nvSpPr>
+          <p:cNvPr id="4" name="Slide Number Placeholder 3"/>
+          <p:cNvSpPr>
+            <a:spLocks noGrp="1"/>
+          </p:cNvSpPr>
+          <p:nvPr>
+            <p:ph type="sldNum" sz="quarter" idx="10"/>
+          </p:nvPr>
+        </p:nvSpPr>
+        <p:spPr/>
+        <p:txBody>
+          <a:bodyPr/>
+          <a:lstStyle/>
+          <a:p>
+            <a:fld id="{5B0F0E0A-5925-EE41-9E85-45EE46DBCCF5}" type="slidenum">
+              <a:rPr lang="en-US" smtClean="0"/>
+              <a:t>36</a:t>
+            </a:fld>
+            <a:endParaRPr lang="en-US"/>
+          </a:p>
+        </p:txBody>
+      </p:sp>
+    </p:spTree>
+    <p:extLst>
+      <p:ext uri="{BB962C8B-B14F-4D97-AF65-F5344CB8AC3E}">
+        <p14:creationId xmlns:p14="http://schemas.microsoft.com/office/powerpoint/2010/main" val="3353908841"/>
+      </p:ext>
+    </p:extLst>
+  </p:cSld>
+  <p:clrMapOvr>
+    <a:masterClrMapping/>
+  </p:clrMapOvr>
+</p:notes>
+</file>
+
 <file path=ppt/slideLayouts/slideLayout1.xml><?xml version="1.0" encoding="utf-8"?>
 <p:sldLayout xmlns:a="http://schemas.openxmlformats.org/drawingml/2006/main" xmlns:r="http://schemas.openxmlformats.org/officeDocument/2006/relationships" xmlns:p="http://schemas.openxmlformats.org/presentationml/2006/main" type="title" preserve="1">
   <p:cSld name="Title Slide">
@@ -1075,7 +1560,7 @@
           <a:p>
             <a:fld id="{6BFECD78-3C8E-49F2-8FAB-59489D168ABB}" type="datetimeFigureOut">
               <a:rPr lang="en-US" smtClean="0"/>
-              <a:t>3/12/12</a:t>
+              <a:t>3/13/12</a:t>
             </a:fld>
             <a:endParaRPr lang="en-US"/>
           </a:p>
@@ -1245,7 +1730,7 @@
           <a:p>
             <a:fld id="{6BFECD78-3C8E-49F2-8FAB-59489D168ABB}" type="datetimeFigureOut">
               <a:rPr lang="en-US" smtClean="0"/>
-              <a:t>3/12/12</a:t>
+              <a:t>3/13/12</a:t>
             </a:fld>
             <a:endParaRPr lang="en-US"/>
           </a:p>
@@ -1425,7 +1910,7 @@
           <a:p>
             <a:fld id="{6BFECD78-3C8E-49F2-8FAB-59489D168ABB}" type="datetimeFigureOut">
               <a:rPr lang="en-US" smtClean="0"/>
-              <a:t>3/12/12</a:t>
+              <a:t>3/13/12</a:t>
             </a:fld>
             <a:endParaRPr lang="en-US"/>
           </a:p>
@@ -1595,7 +2080,7 @@
           <a:p>
             <a:fld id="{6BFECD78-3C8E-49F2-8FAB-59489D168ABB}" type="datetimeFigureOut">
               <a:rPr lang="en-US" smtClean="0"/>
-              <a:t>3/12/12</a:t>
+              <a:t>3/13/12</a:t>
             </a:fld>
             <a:endParaRPr lang="en-US"/>
           </a:p>
@@ -1841,7 +2326,7 @@
           <a:p>
             <a:fld id="{6BFECD78-3C8E-49F2-8FAB-59489D168ABB}" type="datetimeFigureOut">
               <a:rPr lang="en-US" smtClean="0"/>
-              <a:t>3/12/12</a:t>
+              <a:t>3/13/12</a:t>
             </a:fld>
             <a:endParaRPr lang="en-US"/>
           </a:p>
@@ -2129,7 +2614,7 @@
           <a:p>
             <a:fld id="{6BFECD78-3C8E-49F2-8FAB-59489D168ABB}" type="datetimeFigureOut">
               <a:rPr lang="en-US" smtClean="0"/>
-              <a:t>3/12/12</a:t>
+              <a:t>3/13/12</a:t>
             </a:fld>
             <a:endParaRPr lang="en-US"/>
           </a:p>
@@ -2551,7 +3036,7 @@
           <a:p>
             <a:fld id="{6BFECD78-3C8E-49F2-8FAB-59489D168ABB}" type="datetimeFigureOut">
               <a:rPr lang="en-US" smtClean="0"/>
-              <a:t>3/12/12</a:t>
+              <a:t>3/13/12</a:t>
             </a:fld>
             <a:endParaRPr lang="en-US"/>
           </a:p>
@@ -2669,7 +3154,7 @@
           <a:p>
             <a:fld id="{6BFECD78-3C8E-49F2-8FAB-59489D168ABB}" type="datetimeFigureOut">
               <a:rPr lang="en-US" smtClean="0"/>
-              <a:t>3/12/12</a:t>
+              <a:t>3/13/12</a:t>
             </a:fld>
             <a:endParaRPr lang="en-US"/>
           </a:p>
@@ -2764,7 +3249,7 @@
           <a:p>
             <a:fld id="{6BFECD78-3C8E-49F2-8FAB-59489D168ABB}" type="datetimeFigureOut">
               <a:rPr lang="en-US" smtClean="0"/>
-              <a:t>3/12/12</a:t>
+              <a:t>3/13/12</a:t>
             </a:fld>
             <a:endParaRPr lang="en-US"/>
           </a:p>
@@ -3041,7 +3526,7 @@
           <a:p>
             <a:fld id="{6BFECD78-3C8E-49F2-8FAB-59489D168ABB}" type="datetimeFigureOut">
               <a:rPr lang="en-US" smtClean="0"/>
-              <a:t>3/12/12</a:t>
+              <a:t>3/13/12</a:t>
             </a:fld>
             <a:endParaRPr lang="en-US"/>
           </a:p>
@@ -3298,7 +3783,7 @@
           <a:p>
             <a:fld id="{6BFECD78-3C8E-49F2-8FAB-59489D168ABB}" type="datetimeFigureOut">
               <a:rPr lang="en-US" smtClean="0"/>
-              <a:t>3/12/12</a:t>
+              <a:t>3/13/12</a:t>
             </a:fld>
             <a:endParaRPr lang="en-US"/>
           </a:p>
@@ -3511,7 +3996,7 @@
           <a:p>
             <a:fld id="{6BFECD78-3C8E-49F2-8FAB-59489D168ABB}" type="datetimeFigureOut">
               <a:rPr lang="en-US" smtClean="0"/>
-              <a:t>3/12/12</a:t>
+              <a:t>3/13/12</a:t>
             </a:fld>
             <a:endParaRPr lang="en-US"/>
           </a:p>
@@ -4092,11 +4577,11 @@
   <p:clrMapOvr>
     <a:masterClrMapping/>
   </p:clrMapOvr>
-  <mc:AlternateContent xmlns:mc="http://schemas.openxmlformats.org/markup-compatibility/2006">
-    <mc:Choice xmlns:p14="http://schemas.microsoft.com/office/powerpoint/2010/main" Requires="p14">
+  <mc:AlternateContent xmlns:mc="http://schemas.openxmlformats.org/markup-compatibility/2006" xmlns:p14="http://schemas.microsoft.com/office/powerpoint/2010/main">
+    <mc:Choice Requires="p14">
       <p:transition spd="slow" p14:dur="2000"/>
     </mc:Choice>
-    <mc:Fallback>
+    <mc:Fallback xmlns="">
       <p:transition xmlns:p14="http://schemas.microsoft.com/office/powerpoint/2010/main" spd="slow"/>
     </mc:Fallback>
   </mc:AlternateContent>
@@ -4695,7 +5180,7 @@
         </p:nvSpPr>
         <p:spPr>
           <a:xfrm>
-            <a:off x="457200" y="1661869"/>
+            <a:off x="457200" y="2805969"/>
             <a:ext cx="8229600" cy="1143000"/>
           </a:xfrm>
         </p:spPr>
@@ -4712,6 +5197,43 @@
           </a:p>
         </p:txBody>
       </p:sp>
+    </p:spTree>
+    <p:extLst>
+      <p:ext uri="{BB962C8B-B14F-4D97-AF65-F5344CB8AC3E}">
+        <p14:creationId xmlns:p14="http://schemas.microsoft.com/office/powerpoint/2010/main" val="3956439195"/>
+      </p:ext>
+    </p:extLst>
+  </p:cSld>
+  <p:clrMapOvr>
+    <a:masterClrMapping/>
+  </p:clrMapOvr>
+  <p:timing>
+    <p:tnLst>
+      <p:par>
+        <p:cTn xmlns:p14="http://schemas.microsoft.com/office/powerpoint/2010/main" id="1" dur="indefinite" restart="never" nodeType="tmRoot"/>
+      </p:par>
+    </p:tnLst>
+  </p:timing>
+</p:sld>
+</file>
+
+<file path=ppt/slides/slide17.xml><?xml version="1.0" encoding="utf-8"?>
+<p:sld xmlns:a="http://schemas.openxmlformats.org/drawingml/2006/main" xmlns:r="http://schemas.openxmlformats.org/officeDocument/2006/relationships" xmlns:p="http://schemas.openxmlformats.org/presentationml/2006/main">
+  <p:cSld>
+    <p:spTree>
+      <p:nvGrpSpPr>
+        <p:cNvPr id="1" name=""/>
+        <p:cNvGrpSpPr/>
+        <p:nvPr/>
+      </p:nvGrpSpPr>
+      <p:grpSpPr>
+        <a:xfrm>
+          <a:off x="0" y="0"/>
+          <a:ext cx="0" cy="0"/>
+          <a:chOff x="0" y="0"/>
+          <a:chExt cx="0" cy="0"/>
+        </a:xfrm>
+      </p:grpSpPr>
       <p:sp>
         <p:nvSpPr>
           <p:cNvPr id="3" name="TextBox 2"/>
@@ -4721,7 +5243,7 @@
         <p:spPr>
           <a:xfrm>
             <a:off x="457200" y="2775562"/>
-            <a:ext cx="8229600" cy="2554545"/>
+            <a:ext cx="8229600" cy="1323439"/>
           </a:xfrm>
           <a:prstGeom prst="rect">
             <a:avLst/>
@@ -4734,49 +5256,26 @@
           </a:bodyPr>
           <a:lstStyle/>
           <a:p>
-            <a:pPr marL="342900" indent="-342900">
-              <a:buFont typeface="+mj-lt"/>
-              <a:buAutoNum type="arabicPeriod"/>
-            </a:pPr>
-            <a:r>
-              <a:rPr lang="en-US" sz="3200" dirty="0" err="1" smtClean="0"/>
+            <a:r>
+              <a:rPr lang="en-US" sz="4000" dirty="0" err="1" smtClean="0"/>
               <a:t>FileProcessor</a:t>
             </a:r>
             <a:r>
-              <a:rPr lang="en-US" sz="3200" dirty="0" smtClean="0"/>
-              <a:t> is no longer responsible for file processing.</a:t>
-            </a:r>
-          </a:p>
-          <a:p>
-            <a:pPr marL="342900" indent="-342900">
-              <a:buFont typeface="+mj-lt"/>
-              <a:buAutoNum type="arabicPeriod"/>
-            </a:pPr>
-            <a:r>
-              <a:rPr lang="en-US" sz="3200" dirty="0" err="1" smtClean="0"/>
-              <a:t>FileProcessor</a:t>
-            </a:r>
-            <a:r>
-              <a:rPr lang="en-US" sz="3200" dirty="0" smtClean="0"/>
-              <a:t> can parse new file types without changing the class.</a:t>
-            </a:r>
-          </a:p>
-          <a:p>
-            <a:pPr marL="342900" indent="-342900">
-              <a:buFont typeface="+mj-lt"/>
-              <a:buAutoNum type="arabicPeriod"/>
-            </a:pPr>
-            <a:r>
-              <a:rPr lang="en-US" sz="3200" dirty="0" smtClean="0"/>
-              <a:t>Testing of parsing can be done in isolation.</a:t>
-            </a:r>
+              <a:rPr lang="en-US" sz="4000" dirty="0" smtClean="0"/>
+              <a:t> is no longer responsible for file </a:t>
+            </a:r>
+            <a:r>
+              <a:rPr lang="en-US" sz="4000" dirty="0" smtClean="0"/>
+              <a:t>parsing, only the orchestration.</a:t>
+            </a:r>
+            <a:endParaRPr lang="en-US" sz="4000" dirty="0" smtClean="0"/>
           </a:p>
         </p:txBody>
       </p:sp>
     </p:spTree>
     <p:extLst>
       <p:ext uri="{BB962C8B-B14F-4D97-AF65-F5344CB8AC3E}">
-        <p14:creationId xmlns:p14="http://schemas.microsoft.com/office/powerpoint/2010/main" val="3956439195"/>
+        <p14:creationId xmlns:p14="http://schemas.microsoft.com/office/powerpoint/2010/main" val="2810516927"/>
       </p:ext>
     </p:extLst>
   </p:cSld>
@@ -4865,130 +5364,6 @@
 </p:sld>
 </file>
 
-<file path=ppt/slides/slide17.xml><?xml version="1.0" encoding="utf-8"?>
-<p:sld xmlns:a="http://schemas.openxmlformats.org/drawingml/2006/main" xmlns:r="http://schemas.openxmlformats.org/officeDocument/2006/relationships" xmlns:p="http://schemas.openxmlformats.org/presentationml/2006/main">
-  <p:cSld>
-    <p:spTree>
-      <p:nvGrpSpPr>
-        <p:cNvPr id="1" name=""/>
-        <p:cNvGrpSpPr/>
-        <p:nvPr/>
-      </p:nvGrpSpPr>
-      <p:grpSpPr>
-        <a:xfrm>
-          <a:off x="0" y="0"/>
-          <a:ext cx="0" cy="0"/>
-          <a:chOff x="0" y="0"/>
-          <a:chExt cx="0" cy="0"/>
-        </a:xfrm>
-      </p:grpSpPr>
-      <p:sp>
-        <p:nvSpPr>
-          <p:cNvPr id="2" name="Title 1"/>
-          <p:cNvSpPr>
-            <a:spLocks noGrp="1"/>
-          </p:cNvSpPr>
-          <p:nvPr>
-            <p:ph type="title"/>
-          </p:nvPr>
-        </p:nvSpPr>
-        <p:spPr>
-          <a:xfrm>
-            <a:off x="457199" y="2091709"/>
-            <a:ext cx="8229600" cy="790214"/>
-          </a:xfrm>
-        </p:spPr>
-        <p:txBody>
-          <a:bodyPr>
-            <a:normAutofit/>
-          </a:bodyPr>
-          <a:lstStyle/>
-          <a:p>
-            <a:pPr algn="l"/>
-            <a:r>
-              <a:rPr lang="en-US" sz="4000" dirty="0" smtClean="0"/>
-              <a:t>Processing Requirements Week Three</a:t>
-            </a:r>
-            <a:endParaRPr lang="en-US" sz="3200" dirty="0"/>
-          </a:p>
-        </p:txBody>
-      </p:sp>
-      <p:sp>
-        <p:nvSpPr>
-          <p:cNvPr id="3" name="TextBox 2"/>
-          <p:cNvSpPr txBox="1"/>
-          <p:nvPr/>
-        </p:nvSpPr>
-        <p:spPr>
-          <a:xfrm>
-            <a:off x="457199" y="2881923"/>
-            <a:ext cx="8229599" cy="1077218"/>
-          </a:xfrm>
-          <a:prstGeom prst="rect">
-            <a:avLst/>
-          </a:prstGeom>
-          <a:noFill/>
-        </p:spPr>
-        <p:txBody>
-          <a:bodyPr wrap="square" rtlCol="0">
-            <a:spAutoFit/>
-          </a:bodyPr>
-          <a:lstStyle/>
-          <a:p>
-            <a:pPr marL="342900" indent="-342900">
-              <a:buFont typeface="+mj-lt"/>
-              <a:buAutoNum type="arabicPeriod"/>
-            </a:pPr>
-            <a:r>
-              <a:rPr lang="en-US" sz="3200" dirty="0"/>
-              <a:t>Parse </a:t>
-            </a:r>
-            <a:r>
-              <a:rPr lang="en-US" sz="3200" dirty="0" smtClean="0"/>
-              <a:t>either CSV or TSV file</a:t>
-            </a:r>
-          </a:p>
-          <a:p>
-            <a:pPr marL="342900" indent="-342900">
-              <a:buFont typeface="+mj-lt"/>
-              <a:buAutoNum type="arabicPeriod"/>
-            </a:pPr>
-            <a:r>
-              <a:rPr lang="en-US" sz="3200" dirty="0" smtClean="0"/>
-              <a:t>Report </a:t>
-            </a:r>
-            <a:r>
-              <a:rPr lang="en-US" sz="3200" dirty="0"/>
-              <a:t>status of the parsing via </a:t>
-            </a:r>
-            <a:r>
-              <a:rPr lang="en-US" sz="3200" dirty="0" smtClean="0"/>
-              <a:t>Email or SMS</a:t>
-            </a:r>
-            <a:endParaRPr lang="en-US" sz="3200" dirty="0"/>
-          </a:p>
-        </p:txBody>
-      </p:sp>
-    </p:spTree>
-    <p:extLst>
-      <p:ext uri="{BB962C8B-B14F-4D97-AF65-F5344CB8AC3E}">
-        <p14:creationId xmlns:p14="http://schemas.microsoft.com/office/powerpoint/2010/main" val="600365853"/>
-      </p:ext>
-    </p:extLst>
-  </p:cSld>
-  <p:clrMapOvr>
-    <a:masterClrMapping/>
-  </p:clrMapOvr>
-  <p:timing>
-    <p:tnLst>
-      <p:par>
-        <p:cTn xmlns:p14="http://schemas.microsoft.com/office/powerpoint/2010/main" id="1" dur="indefinite" restart="never" nodeType="tmRoot"/>
-      </p:par>
-    </p:tnLst>
-  </p:timing>
-</p:sld>
-</file>
-
 <file path=ppt/slides/slide18.xml><?xml version="1.0" encoding="utf-8"?>
 <p:sld xmlns:a="http://schemas.openxmlformats.org/drawingml/2006/main" xmlns:r="http://schemas.openxmlformats.org/officeDocument/2006/relationships" xmlns:p="http://schemas.openxmlformats.org/presentationml/2006/main">
   <p:cSld>
@@ -5008,43 +5383,14 @@
       </p:grpSpPr>
       <p:sp>
         <p:nvSpPr>
-          <p:cNvPr id="2" name="Title 1"/>
-          <p:cNvSpPr>
-            <a:spLocks noGrp="1"/>
-          </p:cNvSpPr>
-          <p:nvPr>
-            <p:ph type="title"/>
-          </p:nvPr>
-        </p:nvSpPr>
-        <p:spPr>
-          <a:xfrm>
-            <a:off x="457199" y="946272"/>
-            <a:ext cx="8229600" cy="920993"/>
-          </a:xfrm>
-        </p:spPr>
-        <p:txBody>
-          <a:bodyPr/>
-          <a:lstStyle/>
-          <a:p>
-            <a:pPr algn="l"/>
-            <a:r>
-              <a:rPr lang="en-US" dirty="0" smtClean="0"/>
-              <a:t>What is the difference?</a:t>
-            </a:r>
-            <a:endParaRPr lang="en-US" dirty="0"/>
-          </a:p>
-        </p:txBody>
-      </p:sp>
-      <p:sp>
-        <p:nvSpPr>
           <p:cNvPr id="3" name="TextBox 2"/>
           <p:cNvSpPr txBox="1"/>
           <p:nvPr/>
         </p:nvSpPr>
         <p:spPr>
           <a:xfrm>
-            <a:off x="457199" y="1886804"/>
-            <a:ext cx="8229599" cy="3539430"/>
+            <a:off x="457200" y="2775562"/>
+            <a:ext cx="8229600" cy="1323439"/>
           </a:xfrm>
           <a:prstGeom prst="rect">
             <a:avLst/>
@@ -5057,77 +5403,30 @@
           </a:bodyPr>
           <a:lstStyle/>
           <a:p>
-            <a:pPr marL="342900" indent="-342900">
-              <a:buFont typeface="+mj-lt"/>
-              <a:buAutoNum type="arabicPeriod"/>
-            </a:pPr>
-            <a:r>
-              <a:rPr lang="en-US" sz="3200" dirty="0"/>
-              <a:t>Each class is responsible for one thing.</a:t>
-            </a:r>
-          </a:p>
-          <a:p>
-            <a:pPr marL="342900" indent="-342900">
-              <a:buFont typeface="+mj-lt"/>
-              <a:buAutoNum type="arabicPeriod"/>
-            </a:pPr>
-            <a:r>
-              <a:rPr lang="en-US" sz="3200" dirty="0" smtClean="0"/>
-              <a:t>Reporters are functionally interchangeable.</a:t>
-            </a:r>
-          </a:p>
-          <a:p>
-            <a:pPr marL="342900" indent="-342900">
-              <a:buFont typeface="+mj-lt"/>
-              <a:buAutoNum type="arabicPeriod"/>
-            </a:pPr>
-            <a:r>
-              <a:rPr lang="en-US" sz="3200" dirty="0" smtClean="0"/>
-              <a:t>Contracts between </a:t>
-            </a:r>
-            <a:r>
-              <a:rPr lang="en-US" sz="3200" dirty="0" err="1" smtClean="0"/>
-              <a:t>FileReporter</a:t>
-            </a:r>
-            <a:r>
-              <a:rPr lang="en-US" sz="3200" dirty="0" smtClean="0"/>
-              <a:t> and supporting objects are small and easy to learn.</a:t>
-            </a:r>
-          </a:p>
-          <a:p>
-            <a:pPr marL="342900" indent="-342900">
-              <a:buFont typeface="+mj-lt"/>
-              <a:buAutoNum type="arabicPeriod"/>
-            </a:pPr>
-            <a:r>
-              <a:rPr lang="en-US" sz="3200" dirty="0" err="1"/>
+            <a:r>
+              <a:rPr lang="en-US" sz="4000" dirty="0" err="1" smtClean="0"/>
               <a:t>FileProcessor</a:t>
             </a:r>
             <a:r>
-              <a:rPr lang="en-US" sz="3200" dirty="0"/>
-              <a:t> depends on abstract idea of a reporter</a:t>
-            </a:r>
-            <a:r>
-              <a:rPr lang="en-US" sz="3200" dirty="0" smtClean="0"/>
-              <a:t>.</a:t>
-            </a:r>
-          </a:p>
-          <a:p>
-            <a:pPr marL="342900" indent="-342900">
-              <a:buFont typeface="+mj-lt"/>
-              <a:buAutoNum type="arabicPeriod"/>
-            </a:pPr>
-            <a:r>
-              <a:rPr lang="en-US" sz="3200" dirty="0" smtClean="0"/>
-              <a:t>Testing of reporting can be done in isolation.</a:t>
-            </a:r>
+              <a:rPr lang="en-US" sz="4000" dirty="0" smtClean="0"/>
+              <a:t> </a:t>
+            </a:r>
+            <a:r>
+              <a:rPr lang="en-US" sz="4000" dirty="0" smtClean="0"/>
+              <a:t>can parse new file types </a:t>
+            </a:r>
+            <a:r>
+              <a:rPr lang="en-US" sz="4000" dirty="0" smtClean="0"/>
+              <a:t>without having to change.</a:t>
+            </a:r>
+            <a:endParaRPr lang="en-US" sz="4000" dirty="0" smtClean="0"/>
           </a:p>
         </p:txBody>
       </p:sp>
     </p:spTree>
     <p:extLst>
       <p:ext uri="{BB962C8B-B14F-4D97-AF65-F5344CB8AC3E}">
-        <p14:creationId xmlns:p14="http://schemas.microsoft.com/office/powerpoint/2010/main" val="3425361927"/>
+        <p14:creationId xmlns:p14="http://schemas.microsoft.com/office/powerpoint/2010/main" val="2810516927"/>
       </p:ext>
     </p:extLst>
   </p:cSld>
@@ -5163,45 +5462,14 @@
       </p:grpSpPr>
       <p:sp>
         <p:nvSpPr>
-          <p:cNvPr id="2" name="Title 1"/>
-          <p:cNvSpPr>
-            <a:spLocks noGrp="1"/>
-          </p:cNvSpPr>
-          <p:nvPr>
-            <p:ph type="title"/>
-          </p:nvPr>
-        </p:nvSpPr>
-        <p:spPr>
-          <a:xfrm>
-            <a:off x="457199" y="2091709"/>
-            <a:ext cx="8229600" cy="790214"/>
-          </a:xfrm>
-        </p:spPr>
-        <p:txBody>
-          <a:bodyPr>
-            <a:normAutofit/>
-          </a:bodyPr>
-          <a:lstStyle/>
-          <a:p>
-            <a:pPr algn="l"/>
-            <a:r>
-              <a:rPr lang="en-US" sz="4000" dirty="0" smtClean="0"/>
-              <a:t>Future Processing Requirements</a:t>
-            </a:r>
-            <a:endParaRPr lang="en-US" sz="3200" dirty="0"/>
-          </a:p>
-        </p:txBody>
-      </p:sp>
-      <p:sp>
-        <p:nvSpPr>
           <p:cNvPr id="3" name="TextBox 2"/>
           <p:cNvSpPr txBox="1"/>
           <p:nvPr/>
         </p:nvSpPr>
         <p:spPr>
           <a:xfrm>
-            <a:off x="457199" y="2881923"/>
-            <a:ext cx="8229599" cy="1569660"/>
+            <a:off x="457200" y="2775562"/>
+            <a:ext cx="8229600" cy="1323439"/>
           </a:xfrm>
           <a:prstGeom prst="rect">
             <a:avLst/>
@@ -5214,52 +5482,21 @@
           </a:bodyPr>
           <a:lstStyle/>
           <a:p>
-            <a:pPr marL="342900" indent="-342900">
-              <a:buFont typeface="+mj-lt"/>
-              <a:buAutoNum type="arabicPeriod"/>
-            </a:pPr>
-            <a:r>
-              <a:rPr lang="en-US" sz="3200" dirty="0"/>
-              <a:t>Parse </a:t>
-            </a:r>
-            <a:r>
-              <a:rPr lang="en-US" sz="3200" dirty="0" smtClean="0"/>
-              <a:t>either CSV, TSV or PDF files</a:t>
-            </a:r>
-          </a:p>
-          <a:p>
-            <a:pPr marL="342900" indent="-342900">
-              <a:buFont typeface="+mj-lt"/>
-              <a:buAutoNum type="arabicPeriod"/>
-            </a:pPr>
-            <a:r>
-              <a:rPr lang="en-US" sz="3200" dirty="0" smtClean="0"/>
-              <a:t>Report </a:t>
-            </a:r>
-            <a:r>
-              <a:rPr lang="en-US" sz="3200" dirty="0"/>
-              <a:t>status of the parsing via </a:t>
-            </a:r>
-            <a:r>
-              <a:rPr lang="en-US" sz="3200" dirty="0" smtClean="0"/>
-              <a:t>Email, SMS or </a:t>
-            </a:r>
-            <a:r>
-              <a:rPr lang="en-US" sz="3200" dirty="0" err="1" smtClean="0"/>
-              <a:t>Nagios</a:t>
-            </a:r>
-            <a:r>
-              <a:rPr lang="en-US" sz="3200" dirty="0" smtClean="0"/>
-              <a:t>.</a:t>
-            </a:r>
-            <a:endParaRPr lang="en-US" sz="3200" dirty="0"/>
+            <a:r>
+              <a:rPr lang="en-US" sz="4000" dirty="0" smtClean="0"/>
+              <a:t>Testing </a:t>
+            </a:r>
+            <a:r>
+              <a:rPr lang="en-US" sz="4000" dirty="0" smtClean="0"/>
+              <a:t>of parsing can be done in isolation.</a:t>
+            </a:r>
           </a:p>
         </p:txBody>
       </p:sp>
     </p:spTree>
     <p:extLst>
       <p:ext uri="{BB962C8B-B14F-4D97-AF65-F5344CB8AC3E}">
-        <p14:creationId xmlns:p14="http://schemas.microsoft.com/office/powerpoint/2010/main" val="42081683"/>
+        <p14:creationId xmlns:p14="http://schemas.microsoft.com/office/powerpoint/2010/main" val="2810516927"/>
       </p:ext>
     </p:extLst>
   </p:cSld>
@@ -5422,6 +5659,706 @@
         </p:nvSpPr>
         <p:spPr>
           <a:xfrm>
+            <a:off x="457199" y="2091709"/>
+            <a:ext cx="8229600" cy="790214"/>
+          </a:xfrm>
+        </p:spPr>
+        <p:txBody>
+          <a:bodyPr>
+            <a:normAutofit/>
+          </a:bodyPr>
+          <a:lstStyle/>
+          <a:p>
+            <a:pPr algn="l"/>
+            <a:r>
+              <a:rPr lang="en-US" sz="4000" dirty="0" smtClean="0"/>
+              <a:t>Processing Requirements Week Three</a:t>
+            </a:r>
+            <a:endParaRPr lang="en-US" sz="3200" dirty="0"/>
+          </a:p>
+        </p:txBody>
+      </p:sp>
+      <p:sp>
+        <p:nvSpPr>
+          <p:cNvPr id="3" name="TextBox 2"/>
+          <p:cNvSpPr txBox="1"/>
+          <p:nvPr/>
+        </p:nvSpPr>
+        <p:spPr>
+          <a:xfrm>
+            <a:off x="457199" y="2881923"/>
+            <a:ext cx="8229599" cy="1077218"/>
+          </a:xfrm>
+          <a:prstGeom prst="rect">
+            <a:avLst/>
+          </a:prstGeom>
+          <a:noFill/>
+        </p:spPr>
+        <p:txBody>
+          <a:bodyPr wrap="square" rtlCol="0">
+            <a:spAutoFit/>
+          </a:bodyPr>
+          <a:lstStyle/>
+          <a:p>
+            <a:pPr marL="342900" indent="-342900">
+              <a:buFont typeface="+mj-lt"/>
+              <a:buAutoNum type="arabicPeriod"/>
+            </a:pPr>
+            <a:r>
+              <a:rPr lang="en-US" sz="3200" dirty="0"/>
+              <a:t>Parse </a:t>
+            </a:r>
+            <a:r>
+              <a:rPr lang="en-US" sz="3200" dirty="0" smtClean="0"/>
+              <a:t>either CSV or TSV file</a:t>
+            </a:r>
+          </a:p>
+          <a:p>
+            <a:pPr marL="342900" indent="-342900">
+              <a:buFont typeface="+mj-lt"/>
+              <a:buAutoNum type="arabicPeriod"/>
+            </a:pPr>
+            <a:r>
+              <a:rPr lang="en-US" sz="3200" dirty="0" smtClean="0"/>
+              <a:t>Report </a:t>
+            </a:r>
+            <a:r>
+              <a:rPr lang="en-US" sz="3200" dirty="0"/>
+              <a:t>status of the parsing via </a:t>
+            </a:r>
+            <a:r>
+              <a:rPr lang="en-US" sz="3200" dirty="0" smtClean="0"/>
+              <a:t>Email or SMS</a:t>
+            </a:r>
+            <a:endParaRPr lang="en-US" sz="3200" dirty="0"/>
+          </a:p>
+        </p:txBody>
+      </p:sp>
+    </p:spTree>
+    <p:extLst>
+      <p:ext uri="{BB962C8B-B14F-4D97-AF65-F5344CB8AC3E}">
+        <p14:creationId xmlns:p14="http://schemas.microsoft.com/office/powerpoint/2010/main" val="600365853"/>
+      </p:ext>
+    </p:extLst>
+  </p:cSld>
+  <p:clrMapOvr>
+    <a:masterClrMapping/>
+  </p:clrMapOvr>
+  <p:timing>
+    <p:tnLst>
+      <p:par>
+        <p:cTn xmlns:p14="http://schemas.microsoft.com/office/powerpoint/2010/main" id="1" dur="indefinite" restart="never" nodeType="tmRoot"/>
+      </p:par>
+    </p:tnLst>
+  </p:timing>
+</p:sld>
+</file>
+
+<file path=ppt/slides/slide21.xml><?xml version="1.0" encoding="utf-8"?>
+<p:sld xmlns:a="http://schemas.openxmlformats.org/drawingml/2006/main" xmlns:r="http://schemas.openxmlformats.org/officeDocument/2006/relationships" xmlns:p="http://schemas.openxmlformats.org/presentationml/2006/main">
+  <p:cSld>
+    <p:spTree>
+      <p:nvGrpSpPr>
+        <p:cNvPr id="1" name=""/>
+        <p:cNvGrpSpPr/>
+        <p:nvPr/>
+      </p:nvGrpSpPr>
+      <p:grpSpPr>
+        <a:xfrm>
+          <a:off x="0" y="0"/>
+          <a:ext cx="0" cy="0"/>
+          <a:chOff x="0" y="0"/>
+          <a:chExt cx="0" cy="0"/>
+        </a:xfrm>
+      </p:grpSpPr>
+      <p:sp>
+        <p:nvSpPr>
+          <p:cNvPr id="2" name="Title 1"/>
+          <p:cNvSpPr>
+            <a:spLocks noGrp="1"/>
+          </p:cNvSpPr>
+          <p:nvPr>
+            <p:ph type="title"/>
+          </p:nvPr>
+        </p:nvSpPr>
+        <p:spPr>
+          <a:xfrm>
+            <a:off x="457199" y="2968502"/>
+            <a:ext cx="8229600" cy="920993"/>
+          </a:xfrm>
+        </p:spPr>
+        <p:txBody>
+          <a:bodyPr/>
+          <a:lstStyle/>
+          <a:p>
+            <a:pPr algn="l"/>
+            <a:r>
+              <a:rPr lang="en-US" dirty="0" smtClean="0"/>
+              <a:t>What is the difference?</a:t>
+            </a:r>
+            <a:endParaRPr lang="en-US" dirty="0"/>
+          </a:p>
+        </p:txBody>
+      </p:sp>
+    </p:spTree>
+    <p:extLst>
+      <p:ext uri="{BB962C8B-B14F-4D97-AF65-F5344CB8AC3E}">
+        <p14:creationId xmlns:p14="http://schemas.microsoft.com/office/powerpoint/2010/main" val="3425361927"/>
+      </p:ext>
+    </p:extLst>
+  </p:cSld>
+  <p:clrMapOvr>
+    <a:masterClrMapping/>
+  </p:clrMapOvr>
+  <p:timing>
+    <p:tnLst>
+      <p:par>
+        <p:cTn xmlns:p14="http://schemas.microsoft.com/office/powerpoint/2010/main" id="1" dur="indefinite" restart="never" nodeType="tmRoot"/>
+      </p:par>
+    </p:tnLst>
+  </p:timing>
+</p:sld>
+</file>
+
+<file path=ppt/slides/slide22.xml><?xml version="1.0" encoding="utf-8"?>
+<p:sld xmlns:a="http://schemas.openxmlformats.org/drawingml/2006/main" xmlns:r="http://schemas.openxmlformats.org/officeDocument/2006/relationships" xmlns:p="http://schemas.openxmlformats.org/presentationml/2006/main">
+  <p:cSld>
+    <p:spTree>
+      <p:nvGrpSpPr>
+        <p:cNvPr id="1" name=""/>
+        <p:cNvGrpSpPr/>
+        <p:nvPr/>
+      </p:nvGrpSpPr>
+      <p:grpSpPr>
+        <a:xfrm>
+          <a:off x="0" y="0"/>
+          <a:ext cx="0" cy="0"/>
+          <a:chOff x="0" y="0"/>
+          <a:chExt cx="0" cy="0"/>
+        </a:xfrm>
+      </p:grpSpPr>
+      <p:sp>
+        <p:nvSpPr>
+          <p:cNvPr id="3" name="TextBox 2"/>
+          <p:cNvSpPr txBox="1"/>
+          <p:nvPr/>
+        </p:nvSpPr>
+        <p:spPr>
+          <a:xfrm>
+            <a:off x="457199" y="3078650"/>
+            <a:ext cx="8229599" cy="707886"/>
+          </a:xfrm>
+          <a:prstGeom prst="rect">
+            <a:avLst/>
+          </a:prstGeom>
+          <a:noFill/>
+        </p:spPr>
+        <p:txBody>
+          <a:bodyPr wrap="square" rtlCol="0">
+            <a:spAutoFit/>
+          </a:bodyPr>
+          <a:lstStyle/>
+          <a:p>
+            <a:r>
+              <a:rPr lang="en-US" sz="4000" dirty="0"/>
+              <a:t>Each class is responsible for one thing</a:t>
+            </a:r>
+            <a:r>
+              <a:rPr lang="en-US" sz="4000" dirty="0" smtClean="0"/>
+              <a:t>.</a:t>
+            </a:r>
+            <a:endParaRPr lang="en-US" sz="4000" dirty="0"/>
+          </a:p>
+        </p:txBody>
+      </p:sp>
+    </p:spTree>
+    <p:extLst>
+      <p:ext uri="{BB962C8B-B14F-4D97-AF65-F5344CB8AC3E}">
+        <p14:creationId xmlns:p14="http://schemas.microsoft.com/office/powerpoint/2010/main" val="2650504756"/>
+      </p:ext>
+    </p:extLst>
+  </p:cSld>
+  <p:clrMapOvr>
+    <a:masterClrMapping/>
+  </p:clrMapOvr>
+  <p:timing>
+    <p:tnLst>
+      <p:par>
+        <p:cTn xmlns:p14="http://schemas.microsoft.com/office/powerpoint/2010/main" id="1" dur="indefinite" restart="never" nodeType="tmRoot"/>
+      </p:par>
+    </p:tnLst>
+  </p:timing>
+</p:sld>
+</file>
+
+<file path=ppt/slides/slide23.xml><?xml version="1.0" encoding="utf-8"?>
+<p:sld xmlns:a="http://schemas.openxmlformats.org/drawingml/2006/main" xmlns:r="http://schemas.openxmlformats.org/officeDocument/2006/relationships" xmlns:p="http://schemas.openxmlformats.org/presentationml/2006/main">
+  <p:cSld>
+    <p:spTree>
+      <p:nvGrpSpPr>
+        <p:cNvPr id="1" name=""/>
+        <p:cNvGrpSpPr/>
+        <p:nvPr/>
+      </p:nvGrpSpPr>
+      <p:grpSpPr>
+        <a:xfrm>
+          <a:off x="0" y="0"/>
+          <a:ext cx="0" cy="0"/>
+          <a:chOff x="0" y="0"/>
+          <a:chExt cx="0" cy="0"/>
+        </a:xfrm>
+      </p:grpSpPr>
+      <p:sp>
+        <p:nvSpPr>
+          <p:cNvPr id="3" name="TextBox 2"/>
+          <p:cNvSpPr txBox="1"/>
+          <p:nvPr/>
+        </p:nvSpPr>
+        <p:spPr>
+          <a:xfrm>
+            <a:off x="457199" y="2766035"/>
+            <a:ext cx="8229599" cy="1323439"/>
+          </a:xfrm>
+          <a:prstGeom prst="rect">
+            <a:avLst/>
+          </a:prstGeom>
+          <a:noFill/>
+        </p:spPr>
+        <p:txBody>
+          <a:bodyPr wrap="square" rtlCol="0">
+            <a:spAutoFit/>
+          </a:bodyPr>
+          <a:lstStyle/>
+          <a:p>
+            <a:r>
+              <a:rPr lang="en-US" sz="4000" dirty="0" smtClean="0"/>
+              <a:t>Reporters </a:t>
+            </a:r>
+            <a:r>
+              <a:rPr lang="en-US" sz="4000" dirty="0" smtClean="0"/>
+              <a:t>are functionally interchangeable</a:t>
+            </a:r>
+            <a:r>
+              <a:rPr lang="en-US" sz="4000" dirty="0" smtClean="0"/>
+              <a:t>.</a:t>
+            </a:r>
+            <a:endParaRPr lang="en-US" sz="4000" dirty="0" smtClean="0"/>
+          </a:p>
+        </p:txBody>
+      </p:sp>
+    </p:spTree>
+    <p:extLst>
+      <p:ext uri="{BB962C8B-B14F-4D97-AF65-F5344CB8AC3E}">
+        <p14:creationId xmlns:p14="http://schemas.microsoft.com/office/powerpoint/2010/main" val="4225296086"/>
+      </p:ext>
+    </p:extLst>
+  </p:cSld>
+  <p:clrMapOvr>
+    <a:masterClrMapping/>
+  </p:clrMapOvr>
+  <p:timing>
+    <p:tnLst>
+      <p:par>
+        <p:cTn xmlns:p14="http://schemas.microsoft.com/office/powerpoint/2010/main" id="1" dur="indefinite" restart="never" nodeType="tmRoot"/>
+      </p:par>
+    </p:tnLst>
+  </p:timing>
+</p:sld>
+</file>
+
+<file path=ppt/slides/slide24.xml><?xml version="1.0" encoding="utf-8"?>
+<p:sld xmlns:a="http://schemas.openxmlformats.org/drawingml/2006/main" xmlns:r="http://schemas.openxmlformats.org/officeDocument/2006/relationships" xmlns:p="http://schemas.openxmlformats.org/presentationml/2006/main">
+  <p:cSld>
+    <p:spTree>
+      <p:nvGrpSpPr>
+        <p:cNvPr id="1" name=""/>
+        <p:cNvGrpSpPr/>
+        <p:nvPr/>
+      </p:nvGrpSpPr>
+      <p:grpSpPr>
+        <a:xfrm>
+          <a:off x="0" y="0"/>
+          <a:ext cx="0" cy="0"/>
+          <a:chOff x="0" y="0"/>
+          <a:chExt cx="0" cy="0"/>
+        </a:xfrm>
+      </p:grpSpPr>
+      <p:sp>
+        <p:nvSpPr>
+          <p:cNvPr id="3" name="TextBox 2"/>
+          <p:cNvSpPr txBox="1"/>
+          <p:nvPr/>
+        </p:nvSpPr>
+        <p:spPr>
+          <a:xfrm>
+            <a:off x="457199" y="1886804"/>
+            <a:ext cx="8229599" cy="1938992"/>
+          </a:xfrm>
+          <a:prstGeom prst="rect">
+            <a:avLst/>
+          </a:prstGeom>
+          <a:noFill/>
+        </p:spPr>
+        <p:txBody>
+          <a:bodyPr wrap="square" rtlCol="0">
+            <a:spAutoFit/>
+          </a:bodyPr>
+          <a:lstStyle/>
+          <a:p>
+            <a:r>
+              <a:rPr lang="en-US" sz="4000" dirty="0" smtClean="0"/>
+              <a:t>Contracts </a:t>
+            </a:r>
+            <a:r>
+              <a:rPr lang="en-US" sz="4000" dirty="0" smtClean="0"/>
+              <a:t>between </a:t>
+            </a:r>
+            <a:r>
+              <a:rPr lang="en-US" sz="4000" dirty="0" err="1" smtClean="0"/>
+              <a:t>FileReporter</a:t>
+            </a:r>
+            <a:r>
+              <a:rPr lang="en-US" sz="4000" dirty="0" smtClean="0"/>
+              <a:t> and supporting objects are small and easy to learn</a:t>
+            </a:r>
+            <a:r>
+              <a:rPr lang="en-US" sz="4000" dirty="0" smtClean="0"/>
+              <a:t>.</a:t>
+            </a:r>
+            <a:endParaRPr lang="en-US" sz="4000" dirty="0" smtClean="0"/>
+          </a:p>
+        </p:txBody>
+      </p:sp>
+    </p:spTree>
+    <p:extLst>
+      <p:ext uri="{BB962C8B-B14F-4D97-AF65-F5344CB8AC3E}">
+        <p14:creationId xmlns:p14="http://schemas.microsoft.com/office/powerpoint/2010/main" val="4225296086"/>
+      </p:ext>
+    </p:extLst>
+  </p:cSld>
+  <p:clrMapOvr>
+    <a:masterClrMapping/>
+  </p:clrMapOvr>
+  <p:timing>
+    <p:tnLst>
+      <p:par>
+        <p:cTn xmlns:p14="http://schemas.microsoft.com/office/powerpoint/2010/main" id="1" dur="indefinite" restart="never" nodeType="tmRoot"/>
+      </p:par>
+    </p:tnLst>
+  </p:timing>
+</p:sld>
+</file>
+
+<file path=ppt/slides/slide25.xml><?xml version="1.0" encoding="utf-8"?>
+<p:sld xmlns:a="http://schemas.openxmlformats.org/drawingml/2006/main" xmlns:r="http://schemas.openxmlformats.org/officeDocument/2006/relationships" xmlns:p="http://schemas.openxmlformats.org/presentationml/2006/main">
+  <p:cSld>
+    <p:spTree>
+      <p:nvGrpSpPr>
+        <p:cNvPr id="1" name=""/>
+        <p:cNvGrpSpPr/>
+        <p:nvPr/>
+      </p:nvGrpSpPr>
+      <p:grpSpPr>
+        <a:xfrm>
+          <a:off x="0" y="0"/>
+          <a:ext cx="0" cy="0"/>
+          <a:chOff x="0" y="0"/>
+          <a:chExt cx="0" cy="0"/>
+        </a:xfrm>
+      </p:grpSpPr>
+      <p:sp>
+        <p:nvSpPr>
+          <p:cNvPr id="3" name="TextBox 2"/>
+          <p:cNvSpPr txBox="1"/>
+          <p:nvPr/>
+        </p:nvSpPr>
+        <p:spPr>
+          <a:xfrm>
+            <a:off x="457199" y="2766035"/>
+            <a:ext cx="8229599" cy="1323439"/>
+          </a:xfrm>
+          <a:prstGeom prst="rect">
+            <a:avLst/>
+          </a:prstGeom>
+          <a:noFill/>
+        </p:spPr>
+        <p:txBody>
+          <a:bodyPr wrap="square" rtlCol="0">
+            <a:spAutoFit/>
+          </a:bodyPr>
+          <a:lstStyle/>
+          <a:p>
+            <a:r>
+              <a:rPr lang="en-US" sz="4000" dirty="0" err="1" smtClean="0"/>
+              <a:t>FileProcessor</a:t>
+            </a:r>
+            <a:r>
+              <a:rPr lang="en-US" sz="4000" dirty="0" smtClean="0"/>
+              <a:t> </a:t>
+            </a:r>
+            <a:r>
+              <a:rPr lang="en-US" sz="4000" dirty="0"/>
+              <a:t>depends on abstract idea of a reporter</a:t>
+            </a:r>
+            <a:r>
+              <a:rPr lang="en-US" sz="4000" dirty="0" smtClean="0"/>
+              <a:t>.</a:t>
+            </a:r>
+            <a:endParaRPr lang="en-US" sz="4000" dirty="0" smtClean="0"/>
+          </a:p>
+        </p:txBody>
+      </p:sp>
+    </p:spTree>
+    <p:extLst>
+      <p:ext uri="{BB962C8B-B14F-4D97-AF65-F5344CB8AC3E}">
+        <p14:creationId xmlns:p14="http://schemas.microsoft.com/office/powerpoint/2010/main" val="4225296086"/>
+      </p:ext>
+    </p:extLst>
+  </p:cSld>
+  <p:clrMapOvr>
+    <a:masterClrMapping/>
+  </p:clrMapOvr>
+  <p:timing>
+    <p:tnLst>
+      <p:par>
+        <p:cTn xmlns:p14="http://schemas.microsoft.com/office/powerpoint/2010/main" id="1" dur="indefinite" restart="never" nodeType="tmRoot"/>
+      </p:par>
+    </p:tnLst>
+  </p:timing>
+</p:sld>
+</file>
+
+<file path=ppt/slides/slide26.xml><?xml version="1.0" encoding="utf-8"?>
+<p:sld xmlns:a="http://schemas.openxmlformats.org/drawingml/2006/main" xmlns:r="http://schemas.openxmlformats.org/officeDocument/2006/relationships" xmlns:p="http://schemas.openxmlformats.org/presentationml/2006/main">
+  <p:cSld>
+    <p:spTree>
+      <p:nvGrpSpPr>
+        <p:cNvPr id="1" name=""/>
+        <p:cNvGrpSpPr/>
+        <p:nvPr/>
+      </p:nvGrpSpPr>
+      <p:grpSpPr>
+        <a:xfrm>
+          <a:off x="0" y="0"/>
+          <a:ext cx="0" cy="0"/>
+          <a:chOff x="0" y="0"/>
+          <a:chExt cx="0" cy="0"/>
+        </a:xfrm>
+      </p:grpSpPr>
+      <p:sp>
+        <p:nvSpPr>
+          <p:cNvPr id="3" name="TextBox 2"/>
+          <p:cNvSpPr txBox="1"/>
+          <p:nvPr/>
+        </p:nvSpPr>
+        <p:spPr>
+          <a:xfrm>
+            <a:off x="457199" y="2713357"/>
+            <a:ext cx="8229599" cy="1323439"/>
+          </a:xfrm>
+          <a:prstGeom prst="rect">
+            <a:avLst/>
+          </a:prstGeom>
+          <a:noFill/>
+        </p:spPr>
+        <p:txBody>
+          <a:bodyPr wrap="square" rtlCol="0">
+            <a:spAutoFit/>
+          </a:bodyPr>
+          <a:lstStyle/>
+          <a:p>
+            <a:r>
+              <a:rPr lang="en-US" sz="4000" dirty="0" smtClean="0"/>
+              <a:t>Testing </a:t>
+            </a:r>
+            <a:r>
+              <a:rPr lang="en-US" sz="4000" dirty="0" smtClean="0"/>
+              <a:t>of reporting can be done in isolation.</a:t>
+            </a:r>
+          </a:p>
+        </p:txBody>
+      </p:sp>
+    </p:spTree>
+    <p:extLst>
+      <p:ext uri="{BB962C8B-B14F-4D97-AF65-F5344CB8AC3E}">
+        <p14:creationId xmlns:p14="http://schemas.microsoft.com/office/powerpoint/2010/main" val="4225296086"/>
+      </p:ext>
+    </p:extLst>
+  </p:cSld>
+  <p:clrMapOvr>
+    <a:masterClrMapping/>
+  </p:clrMapOvr>
+  <p:timing>
+    <p:tnLst>
+      <p:par>
+        <p:cTn xmlns:p14="http://schemas.microsoft.com/office/powerpoint/2010/main" id="1" dur="indefinite" restart="never" nodeType="tmRoot"/>
+      </p:par>
+    </p:tnLst>
+  </p:timing>
+</p:sld>
+</file>
+
+<file path=ppt/slides/slide27.xml><?xml version="1.0" encoding="utf-8"?>
+<p:sld xmlns:a="http://schemas.openxmlformats.org/drawingml/2006/main" xmlns:r="http://schemas.openxmlformats.org/officeDocument/2006/relationships" xmlns:p="http://schemas.openxmlformats.org/presentationml/2006/main">
+  <p:cSld>
+    <p:spTree>
+      <p:nvGrpSpPr>
+        <p:cNvPr id="1" name=""/>
+        <p:cNvGrpSpPr/>
+        <p:nvPr/>
+      </p:nvGrpSpPr>
+      <p:grpSpPr>
+        <a:xfrm>
+          <a:off x="0" y="0"/>
+          <a:ext cx="0" cy="0"/>
+          <a:chOff x="0" y="0"/>
+          <a:chExt cx="0" cy="0"/>
+        </a:xfrm>
+      </p:grpSpPr>
+      <p:sp>
+        <p:nvSpPr>
+          <p:cNvPr id="2" name="Title 1"/>
+          <p:cNvSpPr>
+            <a:spLocks noGrp="1"/>
+          </p:cNvSpPr>
+          <p:nvPr>
+            <p:ph type="title"/>
+          </p:nvPr>
+        </p:nvSpPr>
+        <p:spPr>
+          <a:xfrm>
+            <a:off x="457199" y="2091709"/>
+            <a:ext cx="8229600" cy="790214"/>
+          </a:xfrm>
+        </p:spPr>
+        <p:txBody>
+          <a:bodyPr>
+            <a:normAutofit/>
+          </a:bodyPr>
+          <a:lstStyle/>
+          <a:p>
+            <a:pPr algn="l"/>
+            <a:r>
+              <a:rPr lang="en-US" sz="4000" dirty="0" smtClean="0"/>
+              <a:t>Future Processing Requirements</a:t>
+            </a:r>
+            <a:endParaRPr lang="en-US" sz="3200" dirty="0"/>
+          </a:p>
+        </p:txBody>
+      </p:sp>
+      <p:sp>
+        <p:nvSpPr>
+          <p:cNvPr id="3" name="TextBox 2"/>
+          <p:cNvSpPr txBox="1"/>
+          <p:nvPr/>
+        </p:nvSpPr>
+        <p:spPr>
+          <a:xfrm>
+            <a:off x="457199" y="2881923"/>
+            <a:ext cx="8229599" cy="1569660"/>
+          </a:xfrm>
+          <a:prstGeom prst="rect">
+            <a:avLst/>
+          </a:prstGeom>
+          <a:noFill/>
+        </p:spPr>
+        <p:txBody>
+          <a:bodyPr wrap="square" rtlCol="0">
+            <a:spAutoFit/>
+          </a:bodyPr>
+          <a:lstStyle/>
+          <a:p>
+            <a:pPr marL="342900" indent="-342900">
+              <a:buFont typeface="+mj-lt"/>
+              <a:buAutoNum type="arabicPeriod"/>
+            </a:pPr>
+            <a:r>
+              <a:rPr lang="en-US" sz="3200" dirty="0"/>
+              <a:t>Parse </a:t>
+            </a:r>
+            <a:r>
+              <a:rPr lang="en-US" sz="3200" dirty="0" smtClean="0"/>
+              <a:t>either CSV, TSV or PDF files</a:t>
+            </a:r>
+          </a:p>
+          <a:p>
+            <a:pPr marL="342900" indent="-342900">
+              <a:buFont typeface="+mj-lt"/>
+              <a:buAutoNum type="arabicPeriod"/>
+            </a:pPr>
+            <a:r>
+              <a:rPr lang="en-US" sz="3200" dirty="0" smtClean="0"/>
+              <a:t>Report </a:t>
+            </a:r>
+            <a:r>
+              <a:rPr lang="en-US" sz="3200" dirty="0"/>
+              <a:t>status of the parsing via </a:t>
+            </a:r>
+            <a:r>
+              <a:rPr lang="en-US" sz="3200" dirty="0" smtClean="0"/>
+              <a:t>Email, SMS or </a:t>
+            </a:r>
+            <a:r>
+              <a:rPr lang="en-US" sz="3200" dirty="0" err="1" smtClean="0"/>
+              <a:t>Nagios</a:t>
+            </a:r>
+            <a:r>
+              <a:rPr lang="en-US" sz="3200" dirty="0" smtClean="0"/>
+              <a:t>.</a:t>
+            </a:r>
+            <a:endParaRPr lang="en-US" sz="3200" dirty="0"/>
+          </a:p>
+        </p:txBody>
+      </p:sp>
+    </p:spTree>
+    <p:extLst>
+      <p:ext uri="{BB962C8B-B14F-4D97-AF65-F5344CB8AC3E}">
+        <p14:creationId xmlns:p14="http://schemas.microsoft.com/office/powerpoint/2010/main" val="42081683"/>
+      </p:ext>
+    </p:extLst>
+  </p:cSld>
+  <p:clrMapOvr>
+    <a:masterClrMapping/>
+  </p:clrMapOvr>
+  <p:timing>
+    <p:tnLst>
+      <p:par>
+        <p:cTn xmlns:p14="http://schemas.microsoft.com/office/powerpoint/2010/main" id="1" dur="indefinite" restart="never" nodeType="tmRoot"/>
+      </p:par>
+    </p:tnLst>
+  </p:timing>
+</p:sld>
+</file>
+
+<file path=ppt/slides/slide28.xml><?xml version="1.0" encoding="utf-8"?>
+<p:sld xmlns:a="http://schemas.openxmlformats.org/drawingml/2006/main" xmlns:r="http://schemas.openxmlformats.org/officeDocument/2006/relationships" xmlns:p="http://schemas.openxmlformats.org/presentationml/2006/main">
+  <p:cSld>
+    <p:spTree>
+      <p:nvGrpSpPr>
+        <p:cNvPr id="1" name=""/>
+        <p:cNvGrpSpPr/>
+        <p:nvPr/>
+      </p:nvGrpSpPr>
+      <p:grpSpPr>
+        <a:xfrm>
+          <a:off x="0" y="0"/>
+          <a:ext cx="0" cy="0"/>
+          <a:chOff x="0" y="0"/>
+          <a:chExt cx="0" cy="0"/>
+        </a:xfrm>
+      </p:grpSpPr>
+      <p:sp>
+        <p:nvSpPr>
+          <p:cNvPr id="2" name="Title 1"/>
+          <p:cNvSpPr>
+            <a:spLocks noGrp="1"/>
+          </p:cNvSpPr>
+          <p:nvPr>
+            <p:ph type="title"/>
+          </p:nvPr>
+        </p:nvSpPr>
+        <p:spPr>
+          <a:xfrm>
             <a:off x="457200" y="2843946"/>
             <a:ext cx="8229600" cy="1143000"/>
           </a:xfrm>
@@ -5458,7 +6395,7 @@
 </p:sld>
 </file>
 
-<file path=ppt/slides/slide21.xml><?xml version="1.0" encoding="utf-8"?>
+<file path=ppt/slides/slide29.xml><?xml version="1.0" encoding="utf-8"?>
 <p:sld xmlns:a="http://schemas.openxmlformats.org/drawingml/2006/main" xmlns:r="http://schemas.openxmlformats.org/officeDocument/2006/relationships" xmlns:p="http://schemas.openxmlformats.org/presentationml/2006/main">
   <p:cSld>
     <p:bg>
@@ -5533,7 +6470,74 @@
 </p:sld>
 </file>
 
-<file path=ppt/slides/slide22.xml><?xml version="1.0" encoding="utf-8"?>
+<file path=ppt/slides/slide3.xml><?xml version="1.0" encoding="utf-8"?>
+<p:sld xmlns:a="http://schemas.openxmlformats.org/drawingml/2006/main" xmlns:r="http://schemas.openxmlformats.org/officeDocument/2006/relationships" xmlns:p="http://schemas.openxmlformats.org/presentationml/2006/main">
+  <p:cSld>
+    <p:spTree>
+      <p:nvGrpSpPr>
+        <p:cNvPr id="1" name=""/>
+        <p:cNvGrpSpPr/>
+        <p:nvPr/>
+      </p:nvGrpSpPr>
+      <p:grpSpPr>
+        <a:xfrm>
+          <a:off x="0" y="0"/>
+          <a:ext cx="0" cy="0"/>
+          <a:chOff x="0" y="0"/>
+          <a:chExt cx="0" cy="0"/>
+        </a:xfrm>
+      </p:grpSpPr>
+      <p:sp>
+        <p:nvSpPr>
+          <p:cNvPr id="4" name="Title 3"/>
+          <p:cNvSpPr>
+            <a:spLocks noGrp="1"/>
+          </p:cNvSpPr>
+          <p:nvPr>
+            <p:ph type="title"/>
+          </p:nvPr>
+        </p:nvSpPr>
+        <p:spPr>
+          <a:xfrm>
+            <a:off x="457200" y="2711170"/>
+            <a:ext cx="8229600" cy="1428103"/>
+          </a:xfrm>
+        </p:spPr>
+        <p:txBody>
+          <a:bodyPr>
+            <a:normAutofit fontScale="90000"/>
+          </a:bodyPr>
+          <a:lstStyle/>
+          <a:p>
+            <a:pPr algn="l"/>
+            <a:r>
+              <a:rPr lang="en-US" dirty="0"/>
+              <a:t>That's great but how does that apply to Ruby?</a:t>
+            </a:r>
+          </a:p>
+        </p:txBody>
+      </p:sp>
+    </p:spTree>
+    <p:extLst>
+      <p:ext uri="{BB962C8B-B14F-4D97-AF65-F5344CB8AC3E}">
+        <p14:creationId xmlns:p14="http://schemas.microsoft.com/office/powerpoint/2010/main" val="3102091573"/>
+      </p:ext>
+    </p:extLst>
+  </p:cSld>
+  <p:clrMapOvr>
+    <a:masterClrMapping/>
+  </p:clrMapOvr>
+  <p:timing>
+    <p:tnLst>
+      <p:par>
+        <p:cTn xmlns:p14="http://schemas.microsoft.com/office/powerpoint/2010/main" id="1" dur="indefinite" restart="never" nodeType="tmRoot"/>
+      </p:par>
+    </p:tnLst>
+  </p:timing>
+</p:sld>
+</file>
+
+<file path=ppt/slides/slide30.xml><?xml version="1.0" encoding="utf-8"?>
 <p:sld xmlns:a="http://schemas.openxmlformats.org/drawingml/2006/main" xmlns:r="http://schemas.openxmlformats.org/officeDocument/2006/relationships" xmlns:p="http://schemas.openxmlformats.org/presentationml/2006/main">
   <p:cSld>
     <p:spTree>
@@ -5603,7 +6607,7 @@
 </p:sld>
 </file>
 
-<file path=ppt/slides/slide23.xml><?xml version="1.0" encoding="utf-8"?>
+<file path=ppt/slides/slide31.xml><?xml version="1.0" encoding="utf-8"?>
 <p:sld xmlns:a="http://schemas.openxmlformats.org/drawingml/2006/main" xmlns:r="http://schemas.openxmlformats.org/officeDocument/2006/relationships" xmlns:p="http://schemas.openxmlformats.org/presentationml/2006/main">
   <p:cSld>
     <p:spTree>
@@ -5680,7 +6684,7 @@
 </p:sld>
 </file>
 
-<file path=ppt/slides/slide24.xml><?xml version="1.0" encoding="utf-8"?>
+<file path=ppt/slides/slide32.xml><?xml version="1.0" encoding="utf-8"?>
 <p:sld xmlns:a="http://schemas.openxmlformats.org/drawingml/2006/main" xmlns:r="http://schemas.openxmlformats.org/officeDocument/2006/relationships" xmlns:p="http://schemas.openxmlformats.org/presentationml/2006/main">
   <p:cSld>
     <p:spTree>
@@ -5754,7 +6758,7 @@
 </p:sld>
 </file>
 
-<file path=ppt/slides/slide25.xml><?xml version="1.0" encoding="utf-8"?>
+<file path=ppt/slides/slide33.xml><?xml version="1.0" encoding="utf-8"?>
 <p:sld xmlns:a="http://schemas.openxmlformats.org/drawingml/2006/main" xmlns:r="http://schemas.openxmlformats.org/officeDocument/2006/relationships" xmlns:p="http://schemas.openxmlformats.org/presentationml/2006/main">
   <p:cSld>
     <p:spTree>
@@ -5824,7 +6828,7 @@
 </p:sld>
 </file>
 
-<file path=ppt/slides/slide26.xml><?xml version="1.0" encoding="utf-8"?>
+<file path=ppt/slides/slide34.xml><?xml version="1.0" encoding="utf-8"?>
 <p:sld xmlns:a="http://schemas.openxmlformats.org/drawingml/2006/main" xmlns:r="http://schemas.openxmlformats.org/officeDocument/2006/relationships" xmlns:p="http://schemas.openxmlformats.org/presentationml/2006/main">
   <p:cSld>
     <p:spTree>
@@ -5894,7 +6898,7 @@
 </p:sld>
 </file>
 
-<file path=ppt/slides/slide27.xml><?xml version="1.0" encoding="utf-8"?>
+<file path=ppt/slides/slide35.xml><?xml version="1.0" encoding="utf-8"?>
 <p:sld xmlns:a="http://schemas.openxmlformats.org/drawingml/2006/main" xmlns:r="http://schemas.openxmlformats.org/officeDocument/2006/relationships" xmlns:p="http://schemas.openxmlformats.org/presentationml/2006/main">
   <p:cSld>
     <p:spTree>
@@ -5920,7 +6924,7 @@
           <p:nvPr/>
         </p:nvPicPr>
         <p:blipFill>
-          <a:blip r:embed="rId2">
+          <a:blip r:embed="rId3">
             <a:extLst>
               <a:ext uri="{28A0092B-C50C-407E-A947-70E740481C1C}">
                 <a14:useLocalDpi xmlns:a14="http://schemas.microsoft.com/office/drawing/2010/main" val="0"/>
@@ -5997,7 +7001,7 @@
 </p:sld>
 </file>
 
-<file path=ppt/slides/slide28.xml><?xml version="1.0" encoding="utf-8"?>
+<file path=ppt/slides/slide36.xml><?xml version="1.0" encoding="utf-8"?>
 <p:sld xmlns:a="http://schemas.openxmlformats.org/drawingml/2006/main" xmlns:r="http://schemas.openxmlformats.org/officeDocument/2006/relationships" xmlns:p="http://schemas.openxmlformats.org/presentationml/2006/main">
   <p:cSld>
     <p:spTree>
@@ -6023,7 +7027,7 @@
           <p:nvPr/>
         </p:nvPicPr>
         <p:blipFill>
-          <a:blip r:embed="rId2">
+          <a:blip r:embed="rId3">
             <a:extLst>
               <a:ext uri="{28A0092B-C50C-407E-A947-70E740481C1C}">
                 <a14:useLocalDpi xmlns:a14="http://schemas.microsoft.com/office/drawing/2010/main" val="0"/>
@@ -6093,7 +7097,7 @@
 </p:sld>
 </file>
 
-<file path=ppt/slides/slide29.xml><?xml version="1.0" encoding="utf-8"?>
+<file path=ppt/slides/slide37.xml><?xml version="1.0" encoding="utf-8"?>
 <p:sld xmlns:a="http://schemas.openxmlformats.org/drawingml/2006/main" xmlns:r="http://schemas.openxmlformats.org/officeDocument/2006/relationships" xmlns:p="http://schemas.openxmlformats.org/presentationml/2006/main">
   <p:cSld>
     <p:spTree>
@@ -6427,73 +7431,6 @@
     <p:extLst>
       <p:ext uri="{BB962C8B-B14F-4D97-AF65-F5344CB8AC3E}">
         <p14:creationId xmlns:p14="http://schemas.microsoft.com/office/powerpoint/2010/main" val="536189703"/>
-      </p:ext>
-    </p:extLst>
-  </p:cSld>
-  <p:clrMapOvr>
-    <a:masterClrMapping/>
-  </p:clrMapOvr>
-  <p:timing>
-    <p:tnLst>
-      <p:par>
-        <p:cTn xmlns:p14="http://schemas.microsoft.com/office/powerpoint/2010/main" id="1" dur="indefinite" restart="never" nodeType="tmRoot"/>
-      </p:par>
-    </p:tnLst>
-  </p:timing>
-</p:sld>
-</file>
-
-<file path=ppt/slides/slide3.xml><?xml version="1.0" encoding="utf-8"?>
-<p:sld xmlns:a="http://schemas.openxmlformats.org/drawingml/2006/main" xmlns:r="http://schemas.openxmlformats.org/officeDocument/2006/relationships" xmlns:p="http://schemas.openxmlformats.org/presentationml/2006/main">
-  <p:cSld>
-    <p:spTree>
-      <p:nvGrpSpPr>
-        <p:cNvPr id="1" name=""/>
-        <p:cNvGrpSpPr/>
-        <p:nvPr/>
-      </p:nvGrpSpPr>
-      <p:grpSpPr>
-        <a:xfrm>
-          <a:off x="0" y="0"/>
-          <a:ext cx="0" cy="0"/>
-          <a:chOff x="0" y="0"/>
-          <a:chExt cx="0" cy="0"/>
-        </a:xfrm>
-      </p:grpSpPr>
-      <p:sp>
-        <p:nvSpPr>
-          <p:cNvPr id="4" name="Title 3"/>
-          <p:cNvSpPr>
-            <a:spLocks noGrp="1"/>
-          </p:cNvSpPr>
-          <p:nvPr>
-            <p:ph type="title"/>
-          </p:nvPr>
-        </p:nvSpPr>
-        <p:spPr>
-          <a:xfrm>
-            <a:off x="457200" y="2711170"/>
-            <a:ext cx="8229600" cy="1428103"/>
-          </a:xfrm>
-        </p:spPr>
-        <p:txBody>
-          <a:bodyPr>
-            <a:normAutofit fontScale="90000"/>
-          </a:bodyPr>
-          <a:lstStyle/>
-          <a:p>
-            <a:pPr algn="l"/>
-            <a:r>
-              <a:rPr lang="en-US" dirty="0"/>
-              <a:t>That's great but how does that apply to Ruby?</a:t>
-            </a:r>
-          </a:p>
-        </p:txBody>
-      </p:sp>
-    </p:spTree>
-    <p:extLst>
-      <p:ext uri="{BB962C8B-B14F-4D97-AF65-F5344CB8AC3E}">
-        <p14:creationId xmlns:p14="http://schemas.microsoft.com/office/powerpoint/2010/main" val="3102091573"/>
       </p:ext>
     </p:extLst>
   </p:cSld>

</xml_diff>

<commit_message>
Added slide for Object on Rails.
</commit_message>
<xml_diff>
--- a/BetterRubyThroughDesignPatterns.pptx
+++ b/BetterRubyThroughDesignPatterns.pptx
@@ -5,7 +5,7 @@
     <p:sldMasterId id="2147483696" r:id="rId1"/>
   </p:sldMasterIdLst>
   <p:notesMasterIdLst>
-    <p:notesMasterId r:id="rId39"/>
+    <p:notesMasterId r:id="rId40"/>
   </p:notesMasterIdLst>
   <p:sldIdLst>
     <p:sldId id="256" r:id="rId2"/>
@@ -19,32 +19,33 @@
     <p:sldId id="264" r:id="rId10"/>
     <p:sldId id="270" r:id="rId11"/>
     <p:sldId id="267" r:id="rId12"/>
-    <p:sldId id="268" r:id="rId13"/>
-    <p:sldId id="265" r:id="rId14"/>
-    <p:sldId id="273" r:id="rId15"/>
-    <p:sldId id="274" r:id="rId16"/>
-    <p:sldId id="278" r:id="rId17"/>
-    <p:sldId id="291" r:id="rId18"/>
-    <p:sldId id="292" r:id="rId19"/>
-    <p:sldId id="293" r:id="rId20"/>
-    <p:sldId id="276" r:id="rId21"/>
-    <p:sldId id="279" r:id="rId22"/>
-    <p:sldId id="294" r:id="rId23"/>
-    <p:sldId id="295" r:id="rId24"/>
-    <p:sldId id="296" r:id="rId25"/>
-    <p:sldId id="297" r:id="rId26"/>
-    <p:sldId id="298" r:id="rId27"/>
-    <p:sldId id="277" r:id="rId28"/>
-    <p:sldId id="280" r:id="rId29"/>
-    <p:sldId id="271" r:id="rId30"/>
-    <p:sldId id="282" r:id="rId31"/>
-    <p:sldId id="285" r:id="rId32"/>
-    <p:sldId id="286" r:id="rId33"/>
-    <p:sldId id="287" r:id="rId34"/>
-    <p:sldId id="288" r:id="rId35"/>
-    <p:sldId id="289" r:id="rId36"/>
-    <p:sldId id="290" r:id="rId37"/>
-    <p:sldId id="266" r:id="rId38"/>
+    <p:sldId id="299" r:id="rId13"/>
+    <p:sldId id="268" r:id="rId14"/>
+    <p:sldId id="265" r:id="rId15"/>
+    <p:sldId id="273" r:id="rId16"/>
+    <p:sldId id="274" r:id="rId17"/>
+    <p:sldId id="278" r:id="rId18"/>
+    <p:sldId id="291" r:id="rId19"/>
+    <p:sldId id="292" r:id="rId20"/>
+    <p:sldId id="293" r:id="rId21"/>
+    <p:sldId id="276" r:id="rId22"/>
+    <p:sldId id="279" r:id="rId23"/>
+    <p:sldId id="294" r:id="rId24"/>
+    <p:sldId id="295" r:id="rId25"/>
+    <p:sldId id="296" r:id="rId26"/>
+    <p:sldId id="297" r:id="rId27"/>
+    <p:sldId id="298" r:id="rId28"/>
+    <p:sldId id="277" r:id="rId29"/>
+    <p:sldId id="280" r:id="rId30"/>
+    <p:sldId id="271" r:id="rId31"/>
+    <p:sldId id="282" r:id="rId32"/>
+    <p:sldId id="285" r:id="rId33"/>
+    <p:sldId id="286" r:id="rId34"/>
+    <p:sldId id="287" r:id="rId35"/>
+    <p:sldId id="288" r:id="rId36"/>
+    <p:sldId id="289" r:id="rId37"/>
+    <p:sldId id="290" r:id="rId38"/>
+    <p:sldId id="266" r:id="rId39"/>
   </p:sldIdLst>
   <p:sldSz cx="9144000" cy="6858000" type="screen4x3"/>
   <p:notesSz cx="6858000" cy="9144000"/>
@@ -159,6 +160,7 @@
             <p14:sldId id="264"/>
             <p14:sldId id="270"/>
             <p14:sldId id="267"/>
+            <p14:sldId id="299"/>
             <p14:sldId id="268"/>
             <p14:sldId id="265"/>
             <p14:sldId id="273"/>
@@ -275,7 +277,7 @@
           <a:p>
             <a:fld id="{5A1F8130-46FA-7040-B513-FDA7EF4EBAF4}" type="datetimeFigureOut">
               <a:rPr lang="en-US" smtClean="0"/>
-              <a:t>3/13/12</a:t>
+              <a:t>3/14/12</a:t>
             </a:fld>
             <a:endParaRPr lang="en-US"/>
           </a:p>
@@ -716,7 +718,7 @@
           <a:p>
             <a:fld id="{5B0F0E0A-5925-EE41-9E85-45EE46DBCCF5}" type="slidenum">
               <a:rPr lang="en-US" smtClean="0"/>
-              <a:t>13</a:t>
+              <a:t>14</a:t>
             </a:fld>
             <a:endParaRPr lang="en-US"/>
           </a:p>
@@ -807,7 +809,7 @@
           <a:p>
             <a:fld id="{5B0F0E0A-5925-EE41-9E85-45EE46DBCCF5}" type="slidenum">
               <a:rPr lang="en-US" smtClean="0"/>
-              <a:t>15</a:t>
+              <a:t>16</a:t>
             </a:fld>
             <a:endParaRPr lang="en-US"/>
           </a:p>
@@ -891,7 +893,7 @@
           <a:p>
             <a:fld id="{5B0F0E0A-5925-EE41-9E85-45EE46DBCCF5}" type="slidenum">
               <a:rPr lang="en-US" smtClean="0"/>
-              <a:t>16</a:t>
+              <a:t>17</a:t>
             </a:fld>
             <a:endParaRPr lang="en-US"/>
           </a:p>
@@ -975,7 +977,7 @@
           <a:p>
             <a:fld id="{5B0F0E0A-5925-EE41-9E85-45EE46DBCCF5}" type="slidenum">
               <a:rPr lang="en-US" smtClean="0"/>
-              <a:t>17</a:t>
+              <a:t>18</a:t>
             </a:fld>
             <a:endParaRPr lang="en-US"/>
           </a:p>
@@ -1059,7 +1061,7 @@
           <a:p>
             <a:fld id="{5B0F0E0A-5925-EE41-9E85-45EE46DBCCF5}" type="slidenum">
               <a:rPr lang="en-US" smtClean="0"/>
-              <a:t>18</a:t>
+              <a:t>19</a:t>
             </a:fld>
             <a:endParaRPr lang="en-US"/>
           </a:p>
@@ -1143,7 +1145,7 @@
           <a:p>
             <a:fld id="{5B0F0E0A-5925-EE41-9E85-45EE46DBCCF5}" type="slidenum">
               <a:rPr lang="en-US" smtClean="0"/>
-              <a:t>19</a:t>
+              <a:t>20</a:t>
             </a:fld>
             <a:endParaRPr lang="en-US"/>
           </a:p>
@@ -1241,7 +1243,7 @@
           <a:p>
             <a:fld id="{5B0F0E0A-5925-EE41-9E85-45EE46DBCCF5}" type="slidenum">
               <a:rPr lang="en-US" smtClean="0"/>
-              <a:t>35</a:t>
+              <a:t>36</a:t>
             </a:fld>
             <a:endParaRPr lang="en-US"/>
           </a:p>
@@ -1360,7 +1362,7 @@
           <a:p>
             <a:fld id="{5B0F0E0A-5925-EE41-9E85-45EE46DBCCF5}" type="slidenum">
               <a:rPr lang="en-US" smtClean="0"/>
-              <a:t>36</a:t>
+              <a:t>37</a:t>
             </a:fld>
             <a:endParaRPr lang="en-US"/>
           </a:p>
@@ -1560,7 +1562,7 @@
           <a:p>
             <a:fld id="{6BFECD78-3C8E-49F2-8FAB-59489D168ABB}" type="datetimeFigureOut">
               <a:rPr lang="en-US" smtClean="0"/>
-              <a:t>3/13/12</a:t>
+              <a:t>3/14/12</a:t>
             </a:fld>
             <a:endParaRPr lang="en-US"/>
           </a:p>
@@ -1730,7 +1732,7 @@
           <a:p>
             <a:fld id="{6BFECD78-3C8E-49F2-8FAB-59489D168ABB}" type="datetimeFigureOut">
               <a:rPr lang="en-US" smtClean="0"/>
-              <a:t>3/13/12</a:t>
+              <a:t>3/14/12</a:t>
             </a:fld>
             <a:endParaRPr lang="en-US"/>
           </a:p>
@@ -1910,7 +1912,7 @@
           <a:p>
             <a:fld id="{6BFECD78-3C8E-49F2-8FAB-59489D168ABB}" type="datetimeFigureOut">
               <a:rPr lang="en-US" smtClean="0"/>
-              <a:t>3/13/12</a:t>
+              <a:t>3/14/12</a:t>
             </a:fld>
             <a:endParaRPr lang="en-US"/>
           </a:p>
@@ -2080,7 +2082,7 @@
           <a:p>
             <a:fld id="{6BFECD78-3C8E-49F2-8FAB-59489D168ABB}" type="datetimeFigureOut">
               <a:rPr lang="en-US" smtClean="0"/>
-              <a:t>3/13/12</a:t>
+              <a:t>3/14/12</a:t>
             </a:fld>
             <a:endParaRPr lang="en-US"/>
           </a:p>
@@ -2326,7 +2328,7 @@
           <a:p>
             <a:fld id="{6BFECD78-3C8E-49F2-8FAB-59489D168ABB}" type="datetimeFigureOut">
               <a:rPr lang="en-US" smtClean="0"/>
-              <a:t>3/13/12</a:t>
+              <a:t>3/14/12</a:t>
             </a:fld>
             <a:endParaRPr lang="en-US"/>
           </a:p>
@@ -2614,7 +2616,7 @@
           <a:p>
             <a:fld id="{6BFECD78-3C8E-49F2-8FAB-59489D168ABB}" type="datetimeFigureOut">
               <a:rPr lang="en-US" smtClean="0"/>
-              <a:t>3/13/12</a:t>
+              <a:t>3/14/12</a:t>
             </a:fld>
             <a:endParaRPr lang="en-US"/>
           </a:p>
@@ -3036,7 +3038,7 @@
           <a:p>
             <a:fld id="{6BFECD78-3C8E-49F2-8FAB-59489D168ABB}" type="datetimeFigureOut">
               <a:rPr lang="en-US" smtClean="0"/>
-              <a:t>3/13/12</a:t>
+              <a:t>3/14/12</a:t>
             </a:fld>
             <a:endParaRPr lang="en-US"/>
           </a:p>
@@ -3154,7 +3156,7 @@
           <a:p>
             <a:fld id="{6BFECD78-3C8E-49F2-8FAB-59489D168ABB}" type="datetimeFigureOut">
               <a:rPr lang="en-US" smtClean="0"/>
-              <a:t>3/13/12</a:t>
+              <a:t>3/14/12</a:t>
             </a:fld>
             <a:endParaRPr lang="en-US"/>
           </a:p>
@@ -3249,7 +3251,7 @@
           <a:p>
             <a:fld id="{6BFECD78-3C8E-49F2-8FAB-59489D168ABB}" type="datetimeFigureOut">
               <a:rPr lang="en-US" smtClean="0"/>
-              <a:t>3/13/12</a:t>
+              <a:t>3/14/12</a:t>
             </a:fld>
             <a:endParaRPr lang="en-US"/>
           </a:p>
@@ -3526,7 +3528,7 @@
           <a:p>
             <a:fld id="{6BFECD78-3C8E-49F2-8FAB-59489D168ABB}" type="datetimeFigureOut">
               <a:rPr lang="en-US" smtClean="0"/>
-              <a:t>3/13/12</a:t>
+              <a:t>3/14/12</a:t>
             </a:fld>
             <a:endParaRPr lang="en-US"/>
           </a:p>
@@ -3783,7 +3785,7 @@
           <a:p>
             <a:fld id="{6BFECD78-3C8E-49F2-8FAB-59489D168ABB}" type="datetimeFigureOut">
               <a:rPr lang="en-US" smtClean="0"/>
-              <a:t>3/13/12</a:t>
+              <a:t>3/14/12</a:t>
             </a:fld>
             <a:endParaRPr lang="en-US"/>
           </a:p>
@@ -3996,7 +3998,7 @@
           <a:p>
             <a:fld id="{6BFECD78-3C8E-49F2-8FAB-59489D168ABB}" type="datetimeFigureOut">
               <a:rPr lang="en-US" smtClean="0"/>
-              <a:t>3/13/12</a:t>
+              <a:t>3/14/12</a:t>
             </a:fld>
             <a:endParaRPr lang="en-US"/>
           </a:p>
@@ -4712,6 +4714,66 @@
       </p:grpSpPr>
       <p:pic>
         <p:nvPicPr>
+          <p:cNvPr id="3" name="Picture 2" descr="objectsOnRails.png"/>
+          <p:cNvPicPr>
+            <a:picLocks noChangeAspect="1"/>
+          </p:cNvPicPr>
+          <p:nvPr/>
+        </p:nvPicPr>
+        <p:blipFill>
+          <a:blip r:embed="rId2">
+            <a:extLst>
+              <a:ext uri="{28A0092B-C50C-407E-A947-70E740481C1C}">
+                <a14:useLocalDpi xmlns:a14="http://schemas.microsoft.com/office/drawing/2010/main" val="0"/>
+              </a:ext>
+            </a:extLst>
+          </a:blip>
+          <a:stretch>
+            <a:fillRect/>
+          </a:stretch>
+        </p:blipFill>
+        <p:spPr>
+          <a:xfrm>
+            <a:off x="1917700" y="0"/>
+            <a:ext cx="5294399" cy="6858000"/>
+          </a:xfrm>
+          <a:prstGeom prst="rect">
+            <a:avLst/>
+          </a:prstGeom>
+        </p:spPr>
+      </p:pic>
+    </p:spTree>
+    <p:extLst>
+      <p:ext uri="{BB962C8B-B14F-4D97-AF65-F5344CB8AC3E}">
+        <p14:creationId xmlns:p14="http://schemas.microsoft.com/office/powerpoint/2010/main" val="2320922125"/>
+      </p:ext>
+    </p:extLst>
+  </p:cSld>
+  <p:clrMapOvr>
+    <a:masterClrMapping/>
+  </p:clrMapOvr>
+</p:sld>
+</file>
+
+<file path=ppt/slides/slide13.xml><?xml version="1.0" encoding="utf-8"?>
+<p:sld xmlns:a="http://schemas.openxmlformats.org/drawingml/2006/main" xmlns:r="http://schemas.openxmlformats.org/officeDocument/2006/relationships" xmlns:p="http://schemas.openxmlformats.org/presentationml/2006/main">
+  <p:cSld>
+    <p:spTree>
+      <p:nvGrpSpPr>
+        <p:cNvPr id="1" name=""/>
+        <p:cNvGrpSpPr/>
+        <p:nvPr/>
+      </p:nvGrpSpPr>
+      <p:grpSpPr>
+        <a:xfrm>
+          <a:off x="0" y="0"/>
+          <a:ext cx="0" cy="0"/>
+          <a:chOff x="0" y="0"/>
+          <a:chExt cx="0" cy="0"/>
+        </a:xfrm>
+      </p:grpSpPr>
+      <p:pic>
+        <p:nvPicPr>
           <p:cNvPr id="3" name="Picture 2" descr="fatActiveRecordModel.png"/>
           <p:cNvPicPr>
             <a:picLocks noChangeAspect="1"/>
@@ -4760,7 +4822,7 @@
 </p:sld>
 </file>
 
-<file path=ppt/slides/slide13.xml><?xml version="1.0" encoding="utf-8"?>
+<file path=ppt/slides/slide14.xml><?xml version="1.0" encoding="utf-8"?>
 <p:sld xmlns:a="http://schemas.openxmlformats.org/drawingml/2006/main" xmlns:r="http://schemas.openxmlformats.org/officeDocument/2006/relationships" xmlns:p="http://schemas.openxmlformats.org/presentationml/2006/main">
   <p:cSld>
     <p:bg>
@@ -4913,125 +4975,6 @@
 </p:sld>
 </file>
 
-<file path=ppt/slides/slide14.xml><?xml version="1.0" encoding="utf-8"?>
-<p:sld xmlns:a="http://schemas.openxmlformats.org/drawingml/2006/main" xmlns:r="http://schemas.openxmlformats.org/officeDocument/2006/relationships" xmlns:p="http://schemas.openxmlformats.org/presentationml/2006/main">
-  <p:cSld>
-    <p:spTree>
-      <p:nvGrpSpPr>
-        <p:cNvPr id="1" name=""/>
-        <p:cNvGrpSpPr/>
-        <p:nvPr/>
-      </p:nvGrpSpPr>
-      <p:grpSpPr>
-        <a:xfrm>
-          <a:off x="0" y="0"/>
-          <a:ext cx="0" cy="0"/>
-          <a:chOff x="0" y="0"/>
-          <a:chExt cx="0" cy="0"/>
-        </a:xfrm>
-      </p:grpSpPr>
-      <p:sp>
-        <p:nvSpPr>
-          <p:cNvPr id="2" name="Title 1"/>
-          <p:cNvSpPr>
-            <a:spLocks noGrp="1"/>
-          </p:cNvSpPr>
-          <p:nvPr>
-            <p:ph type="title"/>
-          </p:nvPr>
-        </p:nvSpPr>
-        <p:spPr>
-          <a:xfrm>
-            <a:off x="457199" y="2091709"/>
-            <a:ext cx="8229600" cy="790214"/>
-          </a:xfrm>
-        </p:spPr>
-        <p:txBody>
-          <a:bodyPr>
-            <a:normAutofit/>
-          </a:bodyPr>
-          <a:lstStyle/>
-          <a:p>
-            <a:pPr algn="l"/>
-            <a:r>
-              <a:rPr lang="en-US" sz="4000" dirty="0" smtClean="0"/>
-              <a:t>Processing Requirements</a:t>
-            </a:r>
-            <a:endParaRPr lang="en-US" sz="3200" dirty="0"/>
-          </a:p>
-        </p:txBody>
-      </p:sp>
-      <p:sp>
-        <p:nvSpPr>
-          <p:cNvPr id="3" name="TextBox 2"/>
-          <p:cNvSpPr txBox="1"/>
-          <p:nvPr/>
-        </p:nvSpPr>
-        <p:spPr>
-          <a:xfrm>
-            <a:off x="457199" y="2881923"/>
-            <a:ext cx="8229599" cy="1077218"/>
-          </a:xfrm>
-          <a:prstGeom prst="rect">
-            <a:avLst/>
-          </a:prstGeom>
-          <a:noFill/>
-        </p:spPr>
-        <p:txBody>
-          <a:bodyPr wrap="square" rtlCol="0">
-            <a:spAutoFit/>
-          </a:bodyPr>
-          <a:lstStyle/>
-          <a:p>
-            <a:pPr marL="342900" indent="-342900">
-              <a:buFont typeface="+mj-lt"/>
-              <a:buAutoNum type="arabicPeriod"/>
-            </a:pPr>
-            <a:r>
-              <a:rPr lang="en-US" sz="3200" dirty="0"/>
-              <a:t>Parse </a:t>
-            </a:r>
-            <a:r>
-              <a:rPr lang="en-US" sz="3200" dirty="0" smtClean="0"/>
-              <a:t>a CSV file</a:t>
-            </a:r>
-          </a:p>
-          <a:p>
-            <a:pPr marL="342900" indent="-342900">
-              <a:buFont typeface="+mj-lt"/>
-              <a:buAutoNum type="arabicPeriod"/>
-            </a:pPr>
-            <a:r>
-              <a:rPr lang="en-US" sz="3200" dirty="0" smtClean="0"/>
-              <a:t>Report </a:t>
-            </a:r>
-            <a:r>
-              <a:rPr lang="en-US" sz="3200" dirty="0"/>
-              <a:t>status of the parsing via email</a:t>
-            </a:r>
-          </a:p>
-        </p:txBody>
-      </p:sp>
-    </p:spTree>
-    <p:extLst>
-      <p:ext uri="{BB962C8B-B14F-4D97-AF65-F5344CB8AC3E}">
-        <p14:creationId xmlns:p14="http://schemas.microsoft.com/office/powerpoint/2010/main" val="1749495390"/>
-      </p:ext>
-    </p:extLst>
-  </p:cSld>
-  <p:clrMapOvr>
-    <a:masterClrMapping/>
-  </p:clrMapOvr>
-  <p:timing>
-    <p:tnLst>
-      <p:par>
-        <p:cTn xmlns:p14="http://schemas.microsoft.com/office/powerpoint/2010/main" id="1" dur="indefinite" restart="never" nodeType="tmRoot"/>
-      </p:par>
-    </p:tnLst>
-  </p:timing>
-</p:sld>
-</file>
-
 <file path=ppt/slides/slide15.xml><?xml version="1.0" encoding="utf-8"?>
 <p:sld xmlns:a="http://schemas.openxmlformats.org/drawingml/2006/main" xmlns:r="http://schemas.openxmlformats.org/officeDocument/2006/relationships" xmlns:p="http://schemas.openxmlformats.org/presentationml/2006/main">
   <p:cSld>
@@ -5074,7 +5017,7 @@
             <a:pPr algn="l"/>
             <a:r>
               <a:rPr lang="en-US" sz="4000" dirty="0" smtClean="0"/>
-              <a:t>Processing Requirements Week Two</a:t>
+              <a:t>Processing Requirements</a:t>
             </a:r>
             <a:endParaRPr lang="en-US" sz="3200" dirty="0"/>
           </a:p>
@@ -5112,7 +5055,7 @@
             </a:r>
             <a:r>
               <a:rPr lang="en-US" sz="3200" dirty="0" smtClean="0"/>
-              <a:t>either CSV or TSV file</a:t>
+              <a:t>a CSV file</a:t>
             </a:r>
           </a:p>
           <a:p>
@@ -5134,7 +5077,7 @@
     </p:spTree>
     <p:extLst>
       <p:ext uri="{BB962C8B-B14F-4D97-AF65-F5344CB8AC3E}">
-        <p14:creationId xmlns:p14="http://schemas.microsoft.com/office/powerpoint/2010/main" val="2909344124"/>
+        <p14:creationId xmlns:p14="http://schemas.microsoft.com/office/powerpoint/2010/main" val="1749495390"/>
       </p:ext>
     </p:extLst>
   </p:cSld>
@@ -5180,27 +5123,80 @@
         </p:nvSpPr>
         <p:spPr>
           <a:xfrm>
-            <a:off x="457200" y="2805969"/>
-            <a:ext cx="8229600" cy="1143000"/>
+            <a:off x="457199" y="2091709"/>
+            <a:ext cx="8229600" cy="790214"/>
           </a:xfrm>
         </p:spPr>
         <p:txBody>
-          <a:bodyPr/>
+          <a:bodyPr>
+            <a:normAutofit/>
+          </a:bodyPr>
           <a:lstStyle/>
           <a:p>
             <a:pPr algn="l"/>
             <a:r>
-              <a:rPr lang="en-US" dirty="0" smtClean="0"/>
-              <a:t>What is the difference?</a:t>
-            </a:r>
-            <a:endParaRPr lang="en-US" dirty="0"/>
+              <a:rPr lang="en-US" sz="4000" dirty="0" smtClean="0"/>
+              <a:t>Processing Requirements Week Two</a:t>
+            </a:r>
+            <a:endParaRPr lang="en-US" sz="3200" dirty="0"/>
+          </a:p>
+        </p:txBody>
+      </p:sp>
+      <p:sp>
+        <p:nvSpPr>
+          <p:cNvPr id="3" name="TextBox 2"/>
+          <p:cNvSpPr txBox="1"/>
+          <p:nvPr/>
+        </p:nvSpPr>
+        <p:spPr>
+          <a:xfrm>
+            <a:off x="457199" y="2881923"/>
+            <a:ext cx="8229599" cy="1077218"/>
+          </a:xfrm>
+          <a:prstGeom prst="rect">
+            <a:avLst/>
+          </a:prstGeom>
+          <a:noFill/>
+        </p:spPr>
+        <p:txBody>
+          <a:bodyPr wrap="square" rtlCol="0">
+            <a:spAutoFit/>
+          </a:bodyPr>
+          <a:lstStyle/>
+          <a:p>
+            <a:pPr marL="342900" indent="-342900">
+              <a:buFont typeface="+mj-lt"/>
+              <a:buAutoNum type="arabicPeriod"/>
+            </a:pPr>
+            <a:r>
+              <a:rPr lang="en-US" sz="3200" dirty="0"/>
+              <a:t>Parse </a:t>
+            </a:r>
+            <a:r>
+              <a:rPr lang="en-US" sz="3200" dirty="0" smtClean="0"/>
+              <a:t>either CSV or TSV file</a:t>
+            </a:r>
+          </a:p>
+          <a:p>
+            <a:pPr marL="342900" indent="-342900">
+              <a:buFont typeface="+mj-lt"/>
+              <a:buAutoNum type="arabicPeriod"/>
+            </a:pPr>
+            <a:r>
+              <a:rPr lang="en-US" sz="3200" dirty="0" smtClean="0"/>
+              <a:t>Report </a:t>
+            </a:r>
+            <a:r>
+              <a:rPr lang="en-US" sz="3200" dirty="0"/>
+              <a:t>status of the parsing via email</a:t>
+            </a:r>
           </a:p>
         </p:txBody>
       </p:sp>
     </p:spTree>
     <p:extLst>
       <p:ext uri="{BB962C8B-B14F-4D97-AF65-F5344CB8AC3E}">
-        <p14:creationId xmlns:p14="http://schemas.microsoft.com/office/powerpoint/2010/main" val="3956439195"/>
+        <p14:creationId xmlns:p14="http://schemas.microsoft.com/office/powerpoint/2010/main" val="2909344124"/>
       </p:ext>
     </p:extLst>
   </p:cSld>
@@ -5236,6 +5232,72 @@
       </p:grpSpPr>
       <p:sp>
         <p:nvSpPr>
+          <p:cNvPr id="2" name="Title 1"/>
+          <p:cNvSpPr>
+            <a:spLocks noGrp="1"/>
+          </p:cNvSpPr>
+          <p:nvPr>
+            <p:ph type="title"/>
+          </p:nvPr>
+        </p:nvSpPr>
+        <p:spPr>
+          <a:xfrm>
+            <a:off x="457200" y="2805969"/>
+            <a:ext cx="8229600" cy="1143000"/>
+          </a:xfrm>
+        </p:spPr>
+        <p:txBody>
+          <a:bodyPr/>
+          <a:lstStyle/>
+          <a:p>
+            <a:pPr algn="l"/>
+            <a:r>
+              <a:rPr lang="en-US" dirty="0" smtClean="0"/>
+              <a:t>What is the difference?</a:t>
+            </a:r>
+            <a:endParaRPr lang="en-US" dirty="0"/>
+          </a:p>
+        </p:txBody>
+      </p:sp>
+    </p:spTree>
+    <p:extLst>
+      <p:ext uri="{BB962C8B-B14F-4D97-AF65-F5344CB8AC3E}">
+        <p14:creationId xmlns:p14="http://schemas.microsoft.com/office/powerpoint/2010/main" val="3956439195"/>
+      </p:ext>
+    </p:extLst>
+  </p:cSld>
+  <p:clrMapOvr>
+    <a:masterClrMapping/>
+  </p:clrMapOvr>
+  <p:timing>
+    <p:tnLst>
+      <p:par>
+        <p:cTn xmlns:p14="http://schemas.microsoft.com/office/powerpoint/2010/main" id="1" dur="indefinite" restart="never" nodeType="tmRoot"/>
+      </p:par>
+    </p:tnLst>
+  </p:timing>
+</p:sld>
+</file>
+
+<file path=ppt/slides/slide18.xml><?xml version="1.0" encoding="utf-8"?>
+<p:sld xmlns:a="http://schemas.openxmlformats.org/drawingml/2006/main" xmlns:r="http://schemas.openxmlformats.org/officeDocument/2006/relationships" xmlns:p="http://schemas.openxmlformats.org/presentationml/2006/main">
+  <p:cSld>
+    <p:spTree>
+      <p:nvGrpSpPr>
+        <p:cNvPr id="1" name=""/>
+        <p:cNvGrpSpPr/>
+        <p:nvPr/>
+      </p:nvGrpSpPr>
+      <p:grpSpPr>
+        <a:xfrm>
+          <a:off x="0" y="0"/>
+          <a:ext cx="0" cy="0"/>
+          <a:chOff x="0" y="0"/>
+          <a:chExt cx="0" cy="0"/>
+        </a:xfrm>
+      </p:grpSpPr>
+      <p:sp>
+        <p:nvSpPr>
           <p:cNvPr id="3" name="TextBox 2"/>
           <p:cNvSpPr txBox="1"/>
           <p:nvPr/>
@@ -5262,13 +5324,8 @@
             </a:r>
             <a:r>
               <a:rPr lang="en-US" sz="4000" dirty="0" smtClean="0"/>
-              <a:t> is no longer responsible for file </a:t>
-            </a:r>
-            <a:r>
-              <a:rPr lang="en-US" sz="4000" dirty="0" smtClean="0"/>
-              <a:t>parsing, only the orchestration.</a:t>
-            </a:r>
-            <a:endParaRPr lang="en-US" sz="4000" dirty="0" smtClean="0"/>
+              <a:t> is no longer responsible for file parsing, only the orchestration.</a:t>
+            </a:r>
           </a:p>
         </p:txBody>
       </p:sp>
@@ -5364,85 +5421,6 @@
 </p:sld>
 </file>
 
-<file path=ppt/slides/slide18.xml><?xml version="1.0" encoding="utf-8"?>
-<p:sld xmlns:a="http://schemas.openxmlformats.org/drawingml/2006/main" xmlns:r="http://schemas.openxmlformats.org/officeDocument/2006/relationships" xmlns:p="http://schemas.openxmlformats.org/presentationml/2006/main">
-  <p:cSld>
-    <p:spTree>
-      <p:nvGrpSpPr>
-        <p:cNvPr id="1" name=""/>
-        <p:cNvGrpSpPr/>
-        <p:nvPr/>
-      </p:nvGrpSpPr>
-      <p:grpSpPr>
-        <a:xfrm>
-          <a:off x="0" y="0"/>
-          <a:ext cx="0" cy="0"/>
-          <a:chOff x="0" y="0"/>
-          <a:chExt cx="0" cy="0"/>
-        </a:xfrm>
-      </p:grpSpPr>
-      <p:sp>
-        <p:nvSpPr>
-          <p:cNvPr id="3" name="TextBox 2"/>
-          <p:cNvSpPr txBox="1"/>
-          <p:nvPr/>
-        </p:nvSpPr>
-        <p:spPr>
-          <a:xfrm>
-            <a:off x="457200" y="2775562"/>
-            <a:ext cx="8229600" cy="1323439"/>
-          </a:xfrm>
-          <a:prstGeom prst="rect">
-            <a:avLst/>
-          </a:prstGeom>
-          <a:noFill/>
-        </p:spPr>
-        <p:txBody>
-          <a:bodyPr wrap="square" rtlCol="0">
-            <a:spAutoFit/>
-          </a:bodyPr>
-          <a:lstStyle/>
-          <a:p>
-            <a:r>
-              <a:rPr lang="en-US" sz="4000" dirty="0" err="1" smtClean="0"/>
-              <a:t>FileProcessor</a:t>
-            </a:r>
-            <a:r>
-              <a:rPr lang="en-US" sz="4000" dirty="0" smtClean="0"/>
-              <a:t> </a:t>
-            </a:r>
-            <a:r>
-              <a:rPr lang="en-US" sz="4000" dirty="0" smtClean="0"/>
-              <a:t>can parse new file types </a:t>
-            </a:r>
-            <a:r>
-              <a:rPr lang="en-US" sz="4000" dirty="0" smtClean="0"/>
-              <a:t>without having to change.</a:t>
-            </a:r>
-            <a:endParaRPr lang="en-US" sz="4000" dirty="0" smtClean="0"/>
-          </a:p>
-        </p:txBody>
-      </p:sp>
-    </p:spTree>
-    <p:extLst>
-      <p:ext uri="{BB962C8B-B14F-4D97-AF65-F5344CB8AC3E}">
-        <p14:creationId xmlns:p14="http://schemas.microsoft.com/office/powerpoint/2010/main" val="2810516927"/>
-      </p:ext>
-    </p:extLst>
-  </p:cSld>
-  <p:clrMapOvr>
-    <a:masterClrMapping/>
-  </p:clrMapOvr>
-  <p:timing>
-    <p:tnLst>
-      <p:par>
-        <p:cTn xmlns:p14="http://schemas.microsoft.com/office/powerpoint/2010/main" id="1" dur="indefinite" restart="never" nodeType="tmRoot"/>
-      </p:par>
-    </p:tnLst>
-  </p:timing>
-</p:sld>
-</file>
-
 <file path=ppt/slides/slide19.xml><?xml version="1.0" encoding="utf-8"?>
 <p:sld xmlns:a="http://schemas.openxmlformats.org/drawingml/2006/main" xmlns:r="http://schemas.openxmlformats.org/officeDocument/2006/relationships" xmlns:p="http://schemas.openxmlformats.org/presentationml/2006/main">
   <p:cSld>
@@ -5483,12 +5461,12 @@
           <a:lstStyle/>
           <a:p>
             <a:r>
+              <a:rPr lang="en-US" sz="4000" dirty="0" err="1" smtClean="0"/>
+              <a:t>FileProcessor</a:t>
+            </a:r>
+            <a:r>
               <a:rPr lang="en-US" sz="4000" dirty="0" smtClean="0"/>
-              <a:t>Testing </a:t>
-            </a:r>
-            <a:r>
-              <a:rPr lang="en-US" sz="4000" dirty="0" smtClean="0"/>
-              <a:t>of parsing can be done in isolation.</a:t>
+              <a:t> can parse new file types without having to change.</a:t>
             </a:r>
           </a:p>
         </p:txBody>
@@ -5649,45 +5627,14 @@
       </p:grpSpPr>
       <p:sp>
         <p:nvSpPr>
-          <p:cNvPr id="2" name="Title 1"/>
-          <p:cNvSpPr>
-            <a:spLocks noGrp="1"/>
-          </p:cNvSpPr>
-          <p:nvPr>
-            <p:ph type="title"/>
-          </p:nvPr>
-        </p:nvSpPr>
-        <p:spPr>
-          <a:xfrm>
-            <a:off x="457199" y="2091709"/>
-            <a:ext cx="8229600" cy="790214"/>
-          </a:xfrm>
-        </p:spPr>
-        <p:txBody>
-          <a:bodyPr>
-            <a:normAutofit/>
-          </a:bodyPr>
-          <a:lstStyle/>
-          <a:p>
-            <a:pPr algn="l"/>
-            <a:r>
-              <a:rPr lang="en-US" sz="4000" dirty="0" smtClean="0"/>
-              <a:t>Processing Requirements Week Three</a:t>
-            </a:r>
-            <a:endParaRPr lang="en-US" sz="3200" dirty="0"/>
-          </a:p>
-        </p:txBody>
-      </p:sp>
-      <p:sp>
-        <p:nvSpPr>
           <p:cNvPr id="3" name="TextBox 2"/>
           <p:cNvSpPr txBox="1"/>
           <p:nvPr/>
         </p:nvSpPr>
         <p:spPr>
           <a:xfrm>
-            <a:off x="457199" y="2881923"/>
-            <a:ext cx="8229599" cy="1077218"/>
+            <a:off x="457200" y="2775562"/>
+            <a:ext cx="8229600" cy="1323439"/>
           </a:xfrm>
           <a:prstGeom prst="rect">
             <a:avLst/>
@@ -5700,44 +5647,17 @@
           </a:bodyPr>
           <a:lstStyle/>
           <a:p>
-            <a:pPr marL="342900" indent="-342900">
-              <a:buFont typeface="+mj-lt"/>
-              <a:buAutoNum type="arabicPeriod"/>
-            </a:pPr>
-            <a:r>
-              <a:rPr lang="en-US" sz="3200" dirty="0"/>
-              <a:t>Parse </a:t>
-            </a:r>
-            <a:r>
-              <a:rPr lang="en-US" sz="3200" dirty="0" smtClean="0"/>
-              <a:t>either CSV or TSV file</a:t>
-            </a:r>
-          </a:p>
-          <a:p>
-            <a:pPr marL="342900" indent="-342900">
-              <a:buFont typeface="+mj-lt"/>
-              <a:buAutoNum type="arabicPeriod"/>
-            </a:pPr>
-            <a:r>
-              <a:rPr lang="en-US" sz="3200" dirty="0" smtClean="0"/>
-              <a:t>Report </a:t>
-            </a:r>
-            <a:r>
-              <a:rPr lang="en-US" sz="3200" dirty="0"/>
-              <a:t>status of the parsing via </a:t>
-            </a:r>
-            <a:r>
-              <a:rPr lang="en-US" sz="3200" dirty="0" smtClean="0"/>
-              <a:t>Email or SMS</a:t>
-            </a:r>
-            <a:endParaRPr lang="en-US" sz="3200" dirty="0"/>
+            <a:r>
+              <a:rPr lang="en-US" sz="4000" dirty="0" smtClean="0"/>
+              <a:t>Testing of parsing can be done in isolation.</a:t>
+            </a:r>
           </a:p>
         </p:txBody>
       </p:sp>
     </p:spTree>
     <p:extLst>
       <p:ext uri="{BB962C8B-B14F-4D97-AF65-F5344CB8AC3E}">
-        <p14:creationId xmlns:p14="http://schemas.microsoft.com/office/powerpoint/2010/main" val="600365853"/>
+        <p14:creationId xmlns:p14="http://schemas.microsoft.com/office/powerpoint/2010/main" val="2810516927"/>
       </p:ext>
     </p:extLst>
   </p:cSld>
@@ -5783,27 +5703,85 @@
         </p:nvSpPr>
         <p:spPr>
           <a:xfrm>
-            <a:off x="457199" y="2968502"/>
-            <a:ext cx="8229600" cy="920993"/>
+            <a:off x="457199" y="2091709"/>
+            <a:ext cx="8229600" cy="790214"/>
           </a:xfrm>
         </p:spPr>
         <p:txBody>
-          <a:bodyPr/>
+          <a:bodyPr>
+            <a:normAutofit/>
+          </a:bodyPr>
           <a:lstStyle/>
           <a:p>
             <a:pPr algn="l"/>
             <a:r>
-              <a:rPr lang="en-US" dirty="0" smtClean="0"/>
-              <a:t>What is the difference?</a:t>
-            </a:r>
-            <a:endParaRPr lang="en-US" dirty="0"/>
+              <a:rPr lang="en-US" sz="4000" dirty="0" smtClean="0"/>
+              <a:t>Processing Requirements Week Three</a:t>
+            </a:r>
+            <a:endParaRPr lang="en-US" sz="3200" dirty="0"/>
+          </a:p>
+        </p:txBody>
+      </p:sp>
+      <p:sp>
+        <p:nvSpPr>
+          <p:cNvPr id="3" name="TextBox 2"/>
+          <p:cNvSpPr txBox="1"/>
+          <p:nvPr/>
+        </p:nvSpPr>
+        <p:spPr>
+          <a:xfrm>
+            <a:off x="457199" y="2881923"/>
+            <a:ext cx="8229599" cy="1077218"/>
+          </a:xfrm>
+          <a:prstGeom prst="rect">
+            <a:avLst/>
+          </a:prstGeom>
+          <a:noFill/>
+        </p:spPr>
+        <p:txBody>
+          <a:bodyPr wrap="square" rtlCol="0">
+            <a:spAutoFit/>
+          </a:bodyPr>
+          <a:lstStyle/>
+          <a:p>
+            <a:pPr marL="342900" indent="-342900">
+              <a:buFont typeface="+mj-lt"/>
+              <a:buAutoNum type="arabicPeriod"/>
+            </a:pPr>
+            <a:r>
+              <a:rPr lang="en-US" sz="3200" dirty="0"/>
+              <a:t>Parse </a:t>
+            </a:r>
+            <a:r>
+              <a:rPr lang="en-US" sz="3200" dirty="0" smtClean="0"/>
+              <a:t>either CSV or TSV file</a:t>
+            </a:r>
+          </a:p>
+          <a:p>
+            <a:pPr marL="342900" indent="-342900">
+              <a:buFont typeface="+mj-lt"/>
+              <a:buAutoNum type="arabicPeriod"/>
+            </a:pPr>
+            <a:r>
+              <a:rPr lang="en-US" sz="3200" dirty="0" smtClean="0"/>
+              <a:t>Report </a:t>
+            </a:r>
+            <a:r>
+              <a:rPr lang="en-US" sz="3200" dirty="0"/>
+              <a:t>status of the parsing via </a:t>
+            </a:r>
+            <a:r>
+              <a:rPr lang="en-US" sz="3200" dirty="0" smtClean="0"/>
+              <a:t>Email or SMS</a:t>
+            </a:r>
+            <a:endParaRPr lang="en-US" sz="3200" dirty="0"/>
           </a:p>
         </p:txBody>
       </p:sp>
     </p:spTree>
     <p:extLst>
       <p:ext uri="{BB962C8B-B14F-4D97-AF65-F5344CB8AC3E}">
-        <p14:creationId xmlns:p14="http://schemas.microsoft.com/office/powerpoint/2010/main" val="3425361927"/>
+        <p14:creationId xmlns:p14="http://schemas.microsoft.com/office/powerpoint/2010/main" val="600365853"/>
       </p:ext>
     </p:extLst>
   </p:cSld>
@@ -5839,42 +5817,37 @@
       </p:grpSpPr>
       <p:sp>
         <p:nvSpPr>
-          <p:cNvPr id="3" name="TextBox 2"/>
-          <p:cNvSpPr txBox="1"/>
-          <p:nvPr/>
+          <p:cNvPr id="2" name="Title 1"/>
+          <p:cNvSpPr>
+            <a:spLocks noGrp="1"/>
+          </p:cNvSpPr>
+          <p:nvPr>
+            <p:ph type="title"/>
+          </p:nvPr>
         </p:nvSpPr>
         <p:spPr>
           <a:xfrm>
-            <a:off x="457199" y="3078650"/>
-            <a:ext cx="8229599" cy="707886"/>
+            <a:off x="457199" y="2968502"/>
+            <a:ext cx="8229600" cy="920993"/>
           </a:xfrm>
-          <a:prstGeom prst="rect">
-            <a:avLst/>
-          </a:prstGeom>
-          <a:noFill/>
         </p:spPr>
         <p:txBody>
-          <a:bodyPr wrap="square" rtlCol="0">
-            <a:spAutoFit/>
-          </a:bodyPr>
-          <a:lstStyle/>
-          <a:p>
-            <a:r>
-              <a:rPr lang="en-US" sz="4000" dirty="0"/>
-              <a:t>Each class is responsible for one thing</a:t>
-            </a:r>
-            <a:r>
-              <a:rPr lang="en-US" sz="4000" dirty="0" smtClean="0"/>
-              <a:t>.</a:t>
-            </a:r>
-            <a:endParaRPr lang="en-US" sz="4000" dirty="0"/>
+          <a:bodyPr/>
+          <a:lstStyle/>
+          <a:p>
+            <a:pPr algn="l"/>
+            <a:r>
+              <a:rPr lang="en-US" dirty="0" smtClean="0"/>
+              <a:t>What is the difference?</a:t>
+            </a:r>
+            <a:endParaRPr lang="en-US" dirty="0"/>
           </a:p>
         </p:txBody>
       </p:sp>
     </p:spTree>
     <p:extLst>
       <p:ext uri="{BB962C8B-B14F-4D97-AF65-F5344CB8AC3E}">
-        <p14:creationId xmlns:p14="http://schemas.microsoft.com/office/powerpoint/2010/main" val="2650504756"/>
+        <p14:creationId xmlns:p14="http://schemas.microsoft.com/office/powerpoint/2010/main" val="3425361927"/>
       </p:ext>
     </p:extLst>
   </p:cSld>
@@ -5916,8 +5889,8 @@
         </p:nvSpPr>
         <p:spPr>
           <a:xfrm>
-            <a:off x="457199" y="2766035"/>
-            <a:ext cx="8229599" cy="1323439"/>
+            <a:off x="457199" y="3078650"/>
+            <a:ext cx="8229599" cy="707886"/>
           </a:xfrm>
           <a:prstGeom prst="rect">
             <a:avLst/>
@@ -5931,25 +5904,21 @@
           <a:lstStyle/>
           <a:p>
             <a:r>
-              <a:rPr lang="en-US" sz="4000" dirty="0" smtClean="0"/>
-              <a:t>Reporters </a:t>
-            </a:r>
-            <a:r>
-              <a:rPr lang="en-US" sz="4000" dirty="0" smtClean="0"/>
-              <a:t>are functionally interchangeable</a:t>
+              <a:rPr lang="en-US" sz="4000" dirty="0"/>
+              <a:t>Each class is responsible for one thing</a:t>
             </a:r>
             <a:r>
               <a:rPr lang="en-US" sz="4000" dirty="0" smtClean="0"/>
               <a:t>.</a:t>
             </a:r>
-            <a:endParaRPr lang="en-US" sz="4000" dirty="0" smtClean="0"/>
+            <a:endParaRPr lang="en-US" sz="4000" dirty="0"/>
           </a:p>
         </p:txBody>
       </p:sp>
     </p:spTree>
     <p:extLst>
       <p:ext uri="{BB962C8B-B14F-4D97-AF65-F5344CB8AC3E}">
-        <p14:creationId xmlns:p14="http://schemas.microsoft.com/office/powerpoint/2010/main" val="4225296086"/>
+        <p14:creationId xmlns:p14="http://schemas.microsoft.com/office/powerpoint/2010/main" val="2650504756"/>
       </p:ext>
     </p:extLst>
   </p:cSld>
@@ -5991,8 +5960,8 @@
         </p:nvSpPr>
         <p:spPr>
           <a:xfrm>
-            <a:off x="457199" y="1886804"/>
-            <a:ext cx="8229599" cy="1938992"/>
+            <a:off x="457199" y="2766035"/>
+            <a:ext cx="8229599" cy="1323439"/>
           </a:xfrm>
           <a:prstGeom prst="rect">
             <a:avLst/>
@@ -6007,25 +5976,8 @@
           <a:p>
             <a:r>
               <a:rPr lang="en-US" sz="4000" dirty="0" smtClean="0"/>
-              <a:t>Contracts </a:t>
-            </a:r>
-            <a:r>
-              <a:rPr lang="en-US" sz="4000" dirty="0" smtClean="0"/>
-              <a:t>between </a:t>
-            </a:r>
-            <a:r>
-              <a:rPr lang="en-US" sz="4000" dirty="0" err="1" smtClean="0"/>
-              <a:t>FileReporter</a:t>
-            </a:r>
-            <a:r>
-              <a:rPr lang="en-US" sz="4000" dirty="0" smtClean="0"/>
-              <a:t> and supporting objects are small and easy to learn</a:t>
-            </a:r>
-            <a:r>
-              <a:rPr lang="en-US" sz="4000" dirty="0" smtClean="0"/>
-              <a:t>.</a:t>
-            </a:r>
-            <a:endParaRPr lang="en-US" sz="4000" dirty="0" smtClean="0"/>
+              <a:t>Reporters are functionally interchangeable.</a:t>
+            </a:r>
           </a:p>
         </p:txBody>
       </p:sp>
@@ -6074,8 +6026,8 @@
         </p:nvSpPr>
         <p:spPr>
           <a:xfrm>
-            <a:off x="457199" y="2766035"/>
-            <a:ext cx="8229599" cy="1323439"/>
+            <a:off x="457199" y="1886804"/>
+            <a:ext cx="8229599" cy="1938992"/>
           </a:xfrm>
           <a:prstGeom prst="rect">
             <a:avLst/>
@@ -6089,22 +6041,17 @@
           <a:lstStyle/>
           <a:p>
             <a:r>
+              <a:rPr lang="en-US" sz="4000" dirty="0" smtClean="0"/>
+              <a:t>Contracts between </a:t>
+            </a:r>
+            <a:r>
               <a:rPr lang="en-US" sz="4000" dirty="0" err="1" smtClean="0"/>
-              <a:t>FileProcessor</a:t>
+              <a:t>FileReporter</a:t>
             </a:r>
             <a:r>
               <a:rPr lang="en-US" sz="4000" dirty="0" smtClean="0"/>
-              <a:t> </a:t>
-            </a:r>
-            <a:r>
-              <a:rPr lang="en-US" sz="4000" dirty="0"/>
-              <a:t>depends on abstract idea of a reporter</a:t>
-            </a:r>
-            <a:r>
-              <a:rPr lang="en-US" sz="4000" dirty="0" smtClean="0"/>
-              <a:t>.</a:t>
-            </a:r>
-            <a:endParaRPr lang="en-US" sz="4000" dirty="0" smtClean="0"/>
+              <a:t> and supporting objects are small and easy to learn.</a:t>
+            </a:r>
           </a:p>
         </p:txBody>
       </p:sp>
@@ -6153,7 +6100,7 @@
         </p:nvSpPr>
         <p:spPr>
           <a:xfrm>
-            <a:off x="457199" y="2713357"/>
+            <a:off x="457199" y="2766035"/>
             <a:ext cx="8229599" cy="1323439"/>
           </a:xfrm>
           <a:prstGeom prst="rect">
@@ -6168,12 +6115,20 @@
           <a:lstStyle/>
           <a:p>
             <a:r>
+              <a:rPr lang="en-US" sz="4000" dirty="0" err="1" smtClean="0"/>
+              <a:t>FileProcessor</a:t>
+            </a:r>
+            <a:r>
               <a:rPr lang="en-US" sz="4000" dirty="0" smtClean="0"/>
-              <a:t>Testing </a:t>
+              <a:t> </a:t>
+            </a:r>
+            <a:r>
+              <a:rPr lang="en-US" sz="4000" dirty="0"/>
+              <a:t>depends on abstract idea of a reporter</a:t>
             </a:r>
             <a:r>
               <a:rPr lang="en-US" sz="4000" dirty="0" smtClean="0"/>
-              <a:t>of reporting can be done in isolation.</a:t>
+              <a:t>.</a:t>
             </a:r>
           </a:p>
         </p:txBody>
@@ -6217,45 +6172,14 @@
       </p:grpSpPr>
       <p:sp>
         <p:nvSpPr>
-          <p:cNvPr id="2" name="Title 1"/>
-          <p:cNvSpPr>
-            <a:spLocks noGrp="1"/>
-          </p:cNvSpPr>
-          <p:nvPr>
-            <p:ph type="title"/>
-          </p:nvPr>
-        </p:nvSpPr>
-        <p:spPr>
-          <a:xfrm>
-            <a:off x="457199" y="2091709"/>
-            <a:ext cx="8229600" cy="790214"/>
-          </a:xfrm>
-        </p:spPr>
-        <p:txBody>
-          <a:bodyPr>
-            <a:normAutofit/>
-          </a:bodyPr>
-          <a:lstStyle/>
-          <a:p>
-            <a:pPr algn="l"/>
-            <a:r>
-              <a:rPr lang="en-US" sz="4000" dirty="0" smtClean="0"/>
-              <a:t>Future Processing Requirements</a:t>
-            </a:r>
-            <a:endParaRPr lang="en-US" sz="3200" dirty="0"/>
-          </a:p>
-        </p:txBody>
-      </p:sp>
-      <p:sp>
-        <p:nvSpPr>
           <p:cNvPr id="3" name="TextBox 2"/>
           <p:cNvSpPr txBox="1"/>
           <p:nvPr/>
         </p:nvSpPr>
         <p:spPr>
           <a:xfrm>
-            <a:off x="457199" y="2881923"/>
-            <a:ext cx="8229599" cy="1569660"/>
+            <a:off x="457199" y="2713357"/>
+            <a:ext cx="8229599" cy="1323439"/>
           </a:xfrm>
           <a:prstGeom prst="rect">
             <a:avLst/>
@@ -6268,52 +6192,17 @@
           </a:bodyPr>
           <a:lstStyle/>
           <a:p>
-            <a:pPr marL="342900" indent="-342900">
-              <a:buFont typeface="+mj-lt"/>
-              <a:buAutoNum type="arabicPeriod"/>
-            </a:pPr>
-            <a:r>
-              <a:rPr lang="en-US" sz="3200" dirty="0"/>
-              <a:t>Parse </a:t>
-            </a:r>
-            <a:r>
-              <a:rPr lang="en-US" sz="3200" dirty="0" smtClean="0"/>
-              <a:t>either CSV, TSV or PDF files</a:t>
-            </a:r>
-          </a:p>
-          <a:p>
-            <a:pPr marL="342900" indent="-342900">
-              <a:buFont typeface="+mj-lt"/>
-              <a:buAutoNum type="arabicPeriod"/>
-            </a:pPr>
-            <a:r>
-              <a:rPr lang="en-US" sz="3200" dirty="0" smtClean="0"/>
-              <a:t>Report </a:t>
-            </a:r>
-            <a:r>
-              <a:rPr lang="en-US" sz="3200" dirty="0"/>
-              <a:t>status of the parsing via </a:t>
-            </a:r>
-            <a:r>
-              <a:rPr lang="en-US" sz="3200" dirty="0" smtClean="0"/>
-              <a:t>Email, SMS or </a:t>
-            </a:r>
-            <a:r>
-              <a:rPr lang="en-US" sz="3200" dirty="0" err="1" smtClean="0"/>
-              <a:t>Nagios</a:t>
-            </a:r>
-            <a:r>
-              <a:rPr lang="en-US" sz="3200" dirty="0" smtClean="0"/>
-              <a:t>.</a:t>
-            </a:r>
-            <a:endParaRPr lang="en-US" sz="3200" dirty="0"/>
+            <a:r>
+              <a:rPr lang="en-US" sz="4000" dirty="0" smtClean="0"/>
+              <a:t>Testing of reporting can be done in isolation.</a:t>
+            </a:r>
           </a:p>
         </p:txBody>
       </p:sp>
     </p:spTree>
     <p:extLst>
       <p:ext uri="{BB962C8B-B14F-4D97-AF65-F5344CB8AC3E}">
-        <p14:creationId xmlns:p14="http://schemas.microsoft.com/office/powerpoint/2010/main" val="42081683"/>
+        <p14:creationId xmlns:p14="http://schemas.microsoft.com/office/powerpoint/2010/main" val="4225296086"/>
       </p:ext>
     </p:extLst>
   </p:cSld>
@@ -6359,6 +6248,138 @@
         </p:nvSpPr>
         <p:spPr>
           <a:xfrm>
+            <a:off x="457199" y="2091709"/>
+            <a:ext cx="8229600" cy="790214"/>
+          </a:xfrm>
+        </p:spPr>
+        <p:txBody>
+          <a:bodyPr>
+            <a:normAutofit/>
+          </a:bodyPr>
+          <a:lstStyle/>
+          <a:p>
+            <a:pPr algn="l"/>
+            <a:r>
+              <a:rPr lang="en-US" sz="4000" dirty="0" smtClean="0"/>
+              <a:t>Future Processing Requirements</a:t>
+            </a:r>
+            <a:endParaRPr lang="en-US" sz="3200" dirty="0"/>
+          </a:p>
+        </p:txBody>
+      </p:sp>
+      <p:sp>
+        <p:nvSpPr>
+          <p:cNvPr id="3" name="TextBox 2"/>
+          <p:cNvSpPr txBox="1"/>
+          <p:nvPr/>
+        </p:nvSpPr>
+        <p:spPr>
+          <a:xfrm>
+            <a:off x="457199" y="2881923"/>
+            <a:ext cx="8229599" cy="1569660"/>
+          </a:xfrm>
+          <a:prstGeom prst="rect">
+            <a:avLst/>
+          </a:prstGeom>
+          <a:noFill/>
+        </p:spPr>
+        <p:txBody>
+          <a:bodyPr wrap="square" rtlCol="0">
+            <a:spAutoFit/>
+          </a:bodyPr>
+          <a:lstStyle/>
+          <a:p>
+            <a:pPr marL="342900" indent="-342900">
+              <a:buFont typeface="+mj-lt"/>
+              <a:buAutoNum type="arabicPeriod"/>
+            </a:pPr>
+            <a:r>
+              <a:rPr lang="en-US" sz="3200" dirty="0"/>
+              <a:t>Parse </a:t>
+            </a:r>
+            <a:r>
+              <a:rPr lang="en-US" sz="3200" dirty="0" smtClean="0"/>
+              <a:t>either CSV, TSV or PDF files</a:t>
+            </a:r>
+          </a:p>
+          <a:p>
+            <a:pPr marL="342900" indent="-342900">
+              <a:buFont typeface="+mj-lt"/>
+              <a:buAutoNum type="arabicPeriod"/>
+            </a:pPr>
+            <a:r>
+              <a:rPr lang="en-US" sz="3200" dirty="0" smtClean="0"/>
+              <a:t>Report </a:t>
+            </a:r>
+            <a:r>
+              <a:rPr lang="en-US" sz="3200" dirty="0"/>
+              <a:t>status of the parsing via </a:t>
+            </a:r>
+            <a:r>
+              <a:rPr lang="en-US" sz="3200" dirty="0" smtClean="0"/>
+              <a:t>Email, SMS or </a:t>
+            </a:r>
+            <a:r>
+              <a:rPr lang="en-US" sz="3200" dirty="0" err="1" smtClean="0"/>
+              <a:t>Nagios</a:t>
+            </a:r>
+            <a:r>
+              <a:rPr lang="en-US" sz="3200" dirty="0" smtClean="0"/>
+              <a:t>.</a:t>
+            </a:r>
+            <a:endParaRPr lang="en-US" sz="3200" dirty="0"/>
+          </a:p>
+        </p:txBody>
+      </p:sp>
+    </p:spTree>
+    <p:extLst>
+      <p:ext uri="{BB962C8B-B14F-4D97-AF65-F5344CB8AC3E}">
+        <p14:creationId xmlns:p14="http://schemas.microsoft.com/office/powerpoint/2010/main" val="42081683"/>
+      </p:ext>
+    </p:extLst>
+  </p:cSld>
+  <p:clrMapOvr>
+    <a:masterClrMapping/>
+  </p:clrMapOvr>
+  <p:timing>
+    <p:tnLst>
+      <p:par>
+        <p:cTn xmlns:p14="http://schemas.microsoft.com/office/powerpoint/2010/main" id="1" dur="indefinite" restart="never" nodeType="tmRoot"/>
+      </p:par>
+    </p:tnLst>
+  </p:timing>
+</p:sld>
+</file>
+
+<file path=ppt/slides/slide29.xml><?xml version="1.0" encoding="utf-8"?>
+<p:sld xmlns:a="http://schemas.openxmlformats.org/drawingml/2006/main" xmlns:r="http://schemas.openxmlformats.org/officeDocument/2006/relationships" xmlns:p="http://schemas.openxmlformats.org/presentationml/2006/main">
+  <p:cSld>
+    <p:spTree>
+      <p:nvGrpSpPr>
+        <p:cNvPr id="1" name=""/>
+        <p:cNvGrpSpPr/>
+        <p:nvPr/>
+      </p:nvGrpSpPr>
+      <p:grpSpPr>
+        <a:xfrm>
+          <a:off x="0" y="0"/>
+          <a:ext cx="0" cy="0"/>
+          <a:chOff x="0" y="0"/>
+          <a:chExt cx="0" cy="0"/>
+        </a:xfrm>
+      </p:grpSpPr>
+      <p:sp>
+        <p:nvSpPr>
+          <p:cNvPr id="2" name="Title 1"/>
+          <p:cNvSpPr>
+            <a:spLocks noGrp="1"/>
+          </p:cNvSpPr>
+          <p:nvPr>
+            <p:ph type="title"/>
+          </p:nvPr>
+        </p:nvSpPr>
+        <p:spPr>
+          <a:xfrm>
             <a:off x="457200" y="2843946"/>
             <a:ext cx="8229600" cy="1143000"/>
           </a:xfrm>
@@ -6395,7 +6416,74 @@
 </p:sld>
 </file>
 
-<file path=ppt/slides/slide29.xml><?xml version="1.0" encoding="utf-8"?>
+<file path=ppt/slides/slide3.xml><?xml version="1.0" encoding="utf-8"?>
+<p:sld xmlns:a="http://schemas.openxmlformats.org/drawingml/2006/main" xmlns:r="http://schemas.openxmlformats.org/officeDocument/2006/relationships" xmlns:p="http://schemas.openxmlformats.org/presentationml/2006/main">
+  <p:cSld>
+    <p:spTree>
+      <p:nvGrpSpPr>
+        <p:cNvPr id="1" name=""/>
+        <p:cNvGrpSpPr/>
+        <p:nvPr/>
+      </p:nvGrpSpPr>
+      <p:grpSpPr>
+        <a:xfrm>
+          <a:off x="0" y="0"/>
+          <a:ext cx="0" cy="0"/>
+          <a:chOff x="0" y="0"/>
+          <a:chExt cx="0" cy="0"/>
+        </a:xfrm>
+      </p:grpSpPr>
+      <p:sp>
+        <p:nvSpPr>
+          <p:cNvPr id="4" name="Title 3"/>
+          <p:cNvSpPr>
+            <a:spLocks noGrp="1"/>
+          </p:cNvSpPr>
+          <p:nvPr>
+            <p:ph type="title"/>
+          </p:nvPr>
+        </p:nvSpPr>
+        <p:spPr>
+          <a:xfrm>
+            <a:off x="457200" y="2711170"/>
+            <a:ext cx="8229600" cy="1428103"/>
+          </a:xfrm>
+        </p:spPr>
+        <p:txBody>
+          <a:bodyPr>
+            <a:normAutofit fontScale="90000"/>
+          </a:bodyPr>
+          <a:lstStyle/>
+          <a:p>
+            <a:pPr algn="l"/>
+            <a:r>
+              <a:rPr lang="en-US" dirty="0"/>
+              <a:t>That's great but how does that apply to Ruby?</a:t>
+            </a:r>
+          </a:p>
+        </p:txBody>
+      </p:sp>
+    </p:spTree>
+    <p:extLst>
+      <p:ext uri="{BB962C8B-B14F-4D97-AF65-F5344CB8AC3E}">
+        <p14:creationId xmlns:p14="http://schemas.microsoft.com/office/powerpoint/2010/main" val="3102091573"/>
+      </p:ext>
+    </p:extLst>
+  </p:cSld>
+  <p:clrMapOvr>
+    <a:masterClrMapping/>
+  </p:clrMapOvr>
+  <p:timing>
+    <p:tnLst>
+      <p:par>
+        <p:cTn xmlns:p14="http://schemas.microsoft.com/office/powerpoint/2010/main" id="1" dur="indefinite" restart="never" nodeType="tmRoot"/>
+      </p:par>
+    </p:tnLst>
+  </p:timing>
+</p:sld>
+</file>
+
+<file path=ppt/slides/slide30.xml><?xml version="1.0" encoding="utf-8"?>
 <p:sld xmlns:a="http://schemas.openxmlformats.org/drawingml/2006/main" xmlns:r="http://schemas.openxmlformats.org/officeDocument/2006/relationships" xmlns:p="http://schemas.openxmlformats.org/presentationml/2006/main">
   <p:cSld>
     <p:bg>
@@ -6470,143 +6558,6 @@
 </p:sld>
 </file>
 
-<file path=ppt/slides/slide3.xml><?xml version="1.0" encoding="utf-8"?>
-<p:sld xmlns:a="http://schemas.openxmlformats.org/drawingml/2006/main" xmlns:r="http://schemas.openxmlformats.org/officeDocument/2006/relationships" xmlns:p="http://schemas.openxmlformats.org/presentationml/2006/main">
-  <p:cSld>
-    <p:spTree>
-      <p:nvGrpSpPr>
-        <p:cNvPr id="1" name=""/>
-        <p:cNvGrpSpPr/>
-        <p:nvPr/>
-      </p:nvGrpSpPr>
-      <p:grpSpPr>
-        <a:xfrm>
-          <a:off x="0" y="0"/>
-          <a:ext cx="0" cy="0"/>
-          <a:chOff x="0" y="0"/>
-          <a:chExt cx="0" cy="0"/>
-        </a:xfrm>
-      </p:grpSpPr>
-      <p:sp>
-        <p:nvSpPr>
-          <p:cNvPr id="4" name="Title 3"/>
-          <p:cNvSpPr>
-            <a:spLocks noGrp="1"/>
-          </p:cNvSpPr>
-          <p:nvPr>
-            <p:ph type="title"/>
-          </p:nvPr>
-        </p:nvSpPr>
-        <p:spPr>
-          <a:xfrm>
-            <a:off x="457200" y="2711170"/>
-            <a:ext cx="8229600" cy="1428103"/>
-          </a:xfrm>
-        </p:spPr>
-        <p:txBody>
-          <a:bodyPr>
-            <a:normAutofit fontScale="90000"/>
-          </a:bodyPr>
-          <a:lstStyle/>
-          <a:p>
-            <a:pPr algn="l"/>
-            <a:r>
-              <a:rPr lang="en-US" dirty="0"/>
-              <a:t>That's great but how does that apply to Ruby?</a:t>
-            </a:r>
-          </a:p>
-        </p:txBody>
-      </p:sp>
-    </p:spTree>
-    <p:extLst>
-      <p:ext uri="{BB962C8B-B14F-4D97-AF65-F5344CB8AC3E}">
-        <p14:creationId xmlns:p14="http://schemas.microsoft.com/office/powerpoint/2010/main" val="3102091573"/>
-      </p:ext>
-    </p:extLst>
-  </p:cSld>
-  <p:clrMapOvr>
-    <a:masterClrMapping/>
-  </p:clrMapOvr>
-  <p:timing>
-    <p:tnLst>
-      <p:par>
-        <p:cTn xmlns:p14="http://schemas.microsoft.com/office/powerpoint/2010/main" id="1" dur="indefinite" restart="never" nodeType="tmRoot"/>
-      </p:par>
-    </p:tnLst>
-  </p:timing>
-</p:sld>
-</file>
-
-<file path=ppt/slides/slide30.xml><?xml version="1.0" encoding="utf-8"?>
-<p:sld xmlns:a="http://schemas.openxmlformats.org/drawingml/2006/main" xmlns:r="http://schemas.openxmlformats.org/officeDocument/2006/relationships" xmlns:p="http://schemas.openxmlformats.org/presentationml/2006/main">
-  <p:cSld>
-    <p:spTree>
-      <p:nvGrpSpPr>
-        <p:cNvPr id="1" name=""/>
-        <p:cNvGrpSpPr/>
-        <p:nvPr/>
-      </p:nvGrpSpPr>
-      <p:grpSpPr>
-        <a:xfrm>
-          <a:off x="0" y="0"/>
-          <a:ext cx="0" cy="0"/>
-          <a:chOff x="0" y="0"/>
-          <a:chExt cx="0" cy="0"/>
-        </a:xfrm>
-      </p:grpSpPr>
-      <p:sp>
-        <p:nvSpPr>
-          <p:cNvPr id="3" name="TextBox 2"/>
-          <p:cNvSpPr txBox="1"/>
-          <p:nvPr/>
-        </p:nvSpPr>
-        <p:spPr>
-          <a:xfrm>
-            <a:off x="623277" y="3077308"/>
-            <a:ext cx="8229600" cy="707886"/>
-          </a:xfrm>
-          <a:prstGeom prst="rect">
-            <a:avLst/>
-          </a:prstGeom>
-          <a:noFill/>
-        </p:spPr>
-        <p:txBody>
-          <a:bodyPr wrap="square" rtlCol="0">
-            <a:spAutoFit/>
-          </a:bodyPr>
-          <a:lstStyle/>
-          <a:p>
-            <a:r>
-              <a:rPr lang="en-US" sz="4000" u="sng" dirty="0" smtClean="0"/>
-              <a:t>S</a:t>
-            </a:r>
-            <a:r>
-              <a:rPr lang="en-US" sz="4000" dirty="0" smtClean="0"/>
-              <a:t>ingle Responsibility Principle</a:t>
-            </a:r>
-          </a:p>
-        </p:txBody>
-      </p:sp>
-    </p:spTree>
-    <p:extLst>
-      <p:ext uri="{BB962C8B-B14F-4D97-AF65-F5344CB8AC3E}">
-        <p14:creationId xmlns:p14="http://schemas.microsoft.com/office/powerpoint/2010/main" val="242496255"/>
-      </p:ext>
-    </p:extLst>
-  </p:cSld>
-  <p:clrMapOvr>
-    <a:masterClrMapping/>
-  </p:clrMapOvr>
-  <p:timing>
-    <p:tnLst>
-      <p:par>
-        <p:cTn xmlns:p14="http://schemas.microsoft.com/office/powerpoint/2010/main" id="1" dur="indefinite" restart="never" nodeType="tmRoot"/>
-      </p:par>
-    </p:tnLst>
-  </p:timing>
-</p:sld>
-</file>
-
 <file path=ppt/slides/slide31.xml><?xml version="1.0" encoding="utf-8"?>
 <p:sld xmlns:a="http://schemas.openxmlformats.org/drawingml/2006/main" xmlns:r="http://schemas.openxmlformats.org/officeDocument/2006/relationships" xmlns:p="http://schemas.openxmlformats.org/presentationml/2006/main">
   <p:cSld>
@@ -6632,8 +6583,8 @@
         </p:nvSpPr>
         <p:spPr>
           <a:xfrm>
-            <a:off x="623277" y="2774462"/>
-            <a:ext cx="8229600" cy="1323439"/>
+            <a:off x="623277" y="3077308"/>
+            <a:ext cx="8229600" cy="707886"/>
           </a:xfrm>
           <a:prstGeom prst="rect">
             <a:avLst/>
@@ -6648,26 +6599,19 @@
           <a:p>
             <a:r>
               <a:rPr lang="en-US" sz="4000" u="sng" dirty="0" smtClean="0"/>
-              <a:t>O</a:t>
+              <a:t>S</a:t>
             </a:r>
             <a:r>
               <a:rPr lang="en-US" sz="4000" dirty="0" smtClean="0"/>
-              <a:t>pen for extension</a:t>
-            </a:r>
-          </a:p>
-          <a:p>
-            <a:r>
-              <a:rPr lang="en-US" sz="4000" dirty="0" smtClean="0"/>
-              <a:t>Closed to modification</a:t>
-            </a:r>
-            <a:endParaRPr lang="en-US" sz="4000" dirty="0"/>
+              <a:t>ingle Responsibility Principle</a:t>
+            </a:r>
           </a:p>
         </p:txBody>
       </p:sp>
     </p:spTree>
     <p:extLst>
       <p:ext uri="{BB962C8B-B14F-4D97-AF65-F5344CB8AC3E}">
-        <p14:creationId xmlns:p14="http://schemas.microsoft.com/office/powerpoint/2010/main" val="4273581512"/>
+        <p14:creationId xmlns:p14="http://schemas.microsoft.com/office/powerpoint/2010/main" val="242496255"/>
       </p:ext>
     </p:extLst>
   </p:cSld>
@@ -6710,7 +6654,7 @@
         <p:spPr>
           <a:xfrm>
             <a:off x="623277" y="2774462"/>
-            <a:ext cx="8229600" cy="707886"/>
+            <a:ext cx="8229600" cy="1323439"/>
           </a:xfrm>
           <a:prstGeom prst="rect">
             <a:avLst/>
@@ -6724,24 +6668,27 @@
           <a:lstStyle/>
           <a:p>
             <a:r>
-              <a:rPr lang="en-US" sz="4000" u="sng" dirty="0" err="1"/>
-              <a:t>L</a:t>
-            </a:r>
-            <a:r>
-              <a:rPr lang="en-US" sz="4000" dirty="0" err="1"/>
-              <a:t>iskov</a:t>
-            </a:r>
-            <a:r>
-              <a:rPr lang="en-US" sz="4000" dirty="0"/>
-              <a:t> Substitution Principle</a:t>
-            </a:r>
+              <a:rPr lang="en-US" sz="4000" u="sng" dirty="0" smtClean="0"/>
+              <a:t>O</a:t>
+            </a:r>
+            <a:r>
+              <a:rPr lang="en-US" sz="4000" dirty="0" smtClean="0"/>
+              <a:t>pen for extension</a:t>
+            </a:r>
+          </a:p>
+          <a:p>
+            <a:r>
+              <a:rPr lang="en-US" sz="4000" dirty="0" smtClean="0"/>
+              <a:t>Closed to modification</a:t>
+            </a:r>
+            <a:endParaRPr lang="en-US" sz="4000" dirty="0"/>
           </a:p>
         </p:txBody>
       </p:sp>
     </p:spTree>
     <p:extLst>
       <p:ext uri="{BB962C8B-B14F-4D97-AF65-F5344CB8AC3E}">
-        <p14:creationId xmlns:p14="http://schemas.microsoft.com/office/powerpoint/2010/main" val="2070299927"/>
+        <p14:creationId xmlns:p14="http://schemas.microsoft.com/office/powerpoint/2010/main" val="4273581512"/>
       </p:ext>
     </p:extLst>
   </p:cSld>
@@ -6798,12 +6745,16 @@
           <a:lstStyle/>
           <a:p>
             <a:r>
-              <a:rPr lang="en-US" sz="4000" u="sng" dirty="0"/>
-              <a:t>I</a:t>
+              <a:rPr lang="en-US" sz="4000" u="sng" dirty="0" err="1"/>
+              <a:t>L</a:t>
+            </a:r>
+            <a:r>
+              <a:rPr lang="en-US" sz="4000" dirty="0" err="1"/>
+              <a:t>iskov</a:t>
             </a:r>
             <a:r>
               <a:rPr lang="en-US" sz="4000" dirty="0"/>
-              <a:t>nterface Segregation</a:t>
+              <a:t> Substitution Principle</a:t>
             </a:r>
           </a:p>
         </p:txBody>
@@ -6811,7 +6762,7 @@
     </p:spTree>
     <p:extLst>
       <p:ext uri="{BB962C8B-B14F-4D97-AF65-F5344CB8AC3E}">
-        <p14:creationId xmlns:p14="http://schemas.microsoft.com/office/powerpoint/2010/main" val="2923803041"/>
+        <p14:creationId xmlns:p14="http://schemas.microsoft.com/office/powerpoint/2010/main" val="2070299927"/>
       </p:ext>
     </p:extLst>
   </p:cSld>
@@ -6869,6 +6820,76 @@
           <a:p>
             <a:r>
               <a:rPr lang="en-US" sz="4000" u="sng" dirty="0"/>
+              <a:t>I</a:t>
+            </a:r>
+            <a:r>
+              <a:rPr lang="en-US" sz="4000" dirty="0"/>
+              <a:t>nterface Segregation</a:t>
+            </a:r>
+          </a:p>
+        </p:txBody>
+      </p:sp>
+    </p:spTree>
+    <p:extLst>
+      <p:ext uri="{BB962C8B-B14F-4D97-AF65-F5344CB8AC3E}">
+        <p14:creationId xmlns:p14="http://schemas.microsoft.com/office/powerpoint/2010/main" val="2923803041"/>
+      </p:ext>
+    </p:extLst>
+  </p:cSld>
+  <p:clrMapOvr>
+    <a:masterClrMapping/>
+  </p:clrMapOvr>
+  <p:timing>
+    <p:tnLst>
+      <p:par>
+        <p:cTn xmlns:p14="http://schemas.microsoft.com/office/powerpoint/2010/main" id="1" dur="indefinite" restart="never" nodeType="tmRoot"/>
+      </p:par>
+    </p:tnLst>
+  </p:timing>
+</p:sld>
+</file>
+
+<file path=ppt/slides/slide35.xml><?xml version="1.0" encoding="utf-8"?>
+<p:sld xmlns:a="http://schemas.openxmlformats.org/drawingml/2006/main" xmlns:r="http://schemas.openxmlformats.org/officeDocument/2006/relationships" xmlns:p="http://schemas.openxmlformats.org/presentationml/2006/main">
+  <p:cSld>
+    <p:spTree>
+      <p:nvGrpSpPr>
+        <p:cNvPr id="1" name=""/>
+        <p:cNvGrpSpPr/>
+        <p:nvPr/>
+      </p:nvGrpSpPr>
+      <p:grpSpPr>
+        <a:xfrm>
+          <a:off x="0" y="0"/>
+          <a:ext cx="0" cy="0"/>
+          <a:chOff x="0" y="0"/>
+          <a:chExt cx="0" cy="0"/>
+        </a:xfrm>
+      </p:grpSpPr>
+      <p:sp>
+        <p:nvSpPr>
+          <p:cNvPr id="3" name="TextBox 2"/>
+          <p:cNvSpPr txBox="1"/>
+          <p:nvPr/>
+        </p:nvSpPr>
+        <p:spPr>
+          <a:xfrm>
+            <a:off x="623277" y="2774462"/>
+            <a:ext cx="8229600" cy="707886"/>
+          </a:xfrm>
+          <a:prstGeom prst="rect">
+            <a:avLst/>
+          </a:prstGeom>
+          <a:noFill/>
+        </p:spPr>
+        <p:txBody>
+          <a:bodyPr wrap="square" rtlCol="0">
+            <a:spAutoFit/>
+          </a:bodyPr>
+          <a:lstStyle/>
+          <a:p>
+            <a:r>
+              <a:rPr lang="en-US" sz="4000" u="sng" dirty="0"/>
               <a:t>D</a:t>
             </a:r>
             <a:r>
@@ -6898,7 +6919,7 @@
 </p:sld>
 </file>
 
-<file path=ppt/slides/slide35.xml><?xml version="1.0" encoding="utf-8"?>
+<file path=ppt/slides/slide36.xml><?xml version="1.0" encoding="utf-8"?>
 <p:sld xmlns:a="http://schemas.openxmlformats.org/drawingml/2006/main" xmlns:r="http://schemas.openxmlformats.org/officeDocument/2006/relationships" xmlns:p="http://schemas.openxmlformats.org/presentationml/2006/main">
   <p:cSld>
     <p:spTree>
@@ -7001,7 +7022,7 @@
 </p:sld>
 </file>
 
-<file path=ppt/slides/slide36.xml><?xml version="1.0" encoding="utf-8"?>
+<file path=ppt/slides/slide37.xml><?xml version="1.0" encoding="utf-8"?>
 <p:sld xmlns:a="http://schemas.openxmlformats.org/drawingml/2006/main" xmlns:r="http://schemas.openxmlformats.org/officeDocument/2006/relationships" xmlns:p="http://schemas.openxmlformats.org/presentationml/2006/main">
   <p:cSld>
     <p:spTree>
@@ -7094,10 +7115,17 @@
   <p:clrMapOvr>
     <a:masterClrMapping/>
   </p:clrMapOvr>
+  <p:timing>
+    <p:tnLst>
+      <p:par>
+        <p:cTn xmlns:p14="http://schemas.microsoft.com/office/powerpoint/2010/main" id="1" dur="indefinite" restart="never" nodeType="tmRoot"/>
+      </p:par>
+    </p:tnLst>
+  </p:timing>
 </p:sld>
 </file>
 
-<file path=ppt/slides/slide37.xml><?xml version="1.0" encoding="utf-8"?>
+<file path=ppt/slides/slide38.xml><?xml version="1.0" encoding="utf-8"?>
 <p:sld xmlns:a="http://schemas.openxmlformats.org/drawingml/2006/main" xmlns:r="http://schemas.openxmlformats.org/officeDocument/2006/relationships" xmlns:p="http://schemas.openxmlformats.org/presentationml/2006/main">
   <p:cSld>
     <p:spTree>

</xml_diff>

<commit_message>
Add speaker rate url.
</commit_message>
<xml_diff>
--- a/BetterRubyThroughDesignPatterns.pptx
+++ b/BetterRubyThroughDesignPatterns.pptx
@@ -4431,11 +4431,13 @@
         <p:spPr>
           <a:xfrm>
             <a:off x="685800" y="3329367"/>
-            <a:ext cx="6400800" cy="1752600"/>
+            <a:ext cx="6400800" cy="2327018"/>
           </a:xfrm>
         </p:spPr>
         <p:txBody>
-          <a:bodyPr/>
+          <a:bodyPr>
+            <a:normAutofit lnSpcReduction="10000"/>
+          </a:bodyPr>
           <a:lstStyle/>
           <a:p>
             <a:pPr algn="l"/>
@@ -4452,8 +4454,32 @@
           <a:p>
             <a:pPr algn="l"/>
             <a:r>
+              <a:rPr lang="de-DE" dirty="0"/>
+              <a:t>https://</a:t>
+            </a:r>
+            <a:r>
+              <a:rPr lang="de-DE" dirty="0" err="1"/>
+              <a:t>github.com</a:t>
+            </a:r>
+            <a:r>
+              <a:rPr lang="de-DE" dirty="0"/>
+              <a:t>/</a:t>
+            </a:r>
+            <a:r>
+              <a:rPr lang="de-DE" dirty="0" err="1"/>
+              <a:t>msgehard</a:t>
+            </a:r>
+            <a:endParaRPr lang="en-US" dirty="0" smtClean="0"/>
+          </a:p>
+          <a:p>
+            <a:pPr algn="l"/>
+            <a:r>
               <a:rPr lang="en-US" dirty="0" smtClean="0"/>
-              <a:t>Tech Lead – </a:t>
+              <a:t>Tech </a:t>
+            </a:r>
+            <a:r>
+              <a:rPr lang="en-US" dirty="0" smtClean="0"/>
+              <a:t>Lead – </a:t>
             </a:r>
             <a:r>
               <a:rPr lang="en-US" dirty="0" smtClean="0"/>
@@ -7056,8 +7082,8 @@
         </p:nvSpPr>
         <p:spPr>
           <a:xfrm>
-            <a:off x="-1" y="3214076"/>
-            <a:ext cx="4064001" cy="707886"/>
+            <a:off x="0" y="3214076"/>
+            <a:ext cx="5187462" cy="1528623"/>
           </a:xfrm>
           <a:prstGeom prst="rect">
             <a:avLst/>
@@ -7078,7 +7104,36 @@
             </a:r>
             <a:r>
               <a:rPr lang="en-US" sz="4000" baseline="30000" dirty="0" smtClean="0"/>
-              <a:t>(4)</a:t>
+              <a:t>(</a:t>
+            </a:r>
+            <a:r>
+              <a:rPr lang="en-US" sz="4000" baseline="30000" smtClean="0"/>
+              <a:t>4</a:t>
+            </a:r>
+            <a:r>
+              <a:rPr lang="en-US" sz="4000" baseline="30000" smtClean="0"/>
+              <a:t>)</a:t>
+            </a:r>
+          </a:p>
+          <a:p>
+            <a:endParaRPr lang="en-US" sz="4000" baseline="30000" dirty="0" smtClean="0"/>
+          </a:p>
+          <a:p>
+            <a:r>
+              <a:rPr lang="en-US" sz="4000" baseline="30000" dirty="0"/>
+              <a:t>http://</a:t>
+            </a:r>
+            <a:r>
+              <a:rPr lang="en-US" sz="4000" baseline="30000" dirty="0" err="1"/>
+              <a:t>speakerrate.com</a:t>
+            </a:r>
+            <a:r>
+              <a:rPr lang="en-US" sz="4000" baseline="30000" dirty="0"/>
+              <a:t>/talks/</a:t>
+            </a:r>
+            <a:r>
+              <a:rPr lang="en-US" sz="4000" baseline="30000" dirty="0" smtClean="0"/>
+              <a:t>9437</a:t>
             </a:r>
             <a:endParaRPr lang="en-US" sz="4000" baseline="30000" dirty="0"/>
           </a:p>

</xml_diff>